<commit_message>
Update Methodoloy of Analysis
Update Methodoloy of Analysis
</commit_message>
<xml_diff>
--- a/2021_UOS_Contest_1124.pptx
+++ b/2021_UOS_Contest_1124.pptx
@@ -4798,7 +4798,7 @@
                 <a:ea typeface="나눔스퀘어" panose="020B0600000101010101" pitchFamily="50" charset="-127"/>
                 <a:cs typeface="조선일보명조" panose="02030304000000000000" pitchFamily="18" charset="-127"/>
               </a:rPr>
-              <a:t> 중점 유통 주유소 재고현황</a:t>
+              <a:t> 중점 유통 주유소 재고 현황</a:t>
             </a:r>
             <a:endParaRPr lang="en-US" altLang="ko-KR" sz="1600" dirty="0">
               <a:ln>
@@ -5816,6 +5816,3149 @@
           </a:p>
         </p:txBody>
       </p:sp>
+      <p:sp>
+        <p:nvSpPr>
+          <p:cNvPr id="11" name="TextBox 10">
+            <a:extLst>
+              <a:ext uri="{FF2B5EF4-FFF2-40B4-BE49-F238E27FC236}">
+                <a16:creationId xmlns:a16="http://schemas.microsoft.com/office/drawing/2014/main" id="{FD163C1C-3AB4-4452-A88E-05F10E8A1BCC}"/>
+              </a:ext>
+            </a:extLst>
+          </p:cNvPr>
+          <p:cNvSpPr txBox="1"/>
+          <p:nvPr/>
+        </p:nvSpPr>
+        <p:spPr>
+          <a:xfrm>
+            <a:off x="439779" y="1754848"/>
+            <a:ext cx="5446113" cy="1891352"/>
+          </a:xfrm>
+          <a:prstGeom prst="rect">
+            <a:avLst/>
+          </a:prstGeom>
+          <a:noFill/>
+        </p:spPr>
+        <p:txBody>
+          <a:bodyPr wrap="square" rtlCol="0">
+            <a:spAutoFit/>
+          </a:bodyPr>
+          <a:lstStyle/>
+          <a:p>
+            <a:pPr marL="342900" indent="-342900">
+              <a:lnSpc>
+                <a:spcPct val="150000"/>
+              </a:lnSpc>
+              <a:buFont typeface="+mj-lt"/>
+              <a:buAutoNum type="arabicPeriod"/>
+            </a:pPr>
+            <a:r>
+              <a:rPr lang="ko-KR" altLang="en-US" sz="1600" dirty="0">
+                <a:ln>
+                  <a:solidFill>
+                    <a:schemeClr val="bg2">
+                      <a:lumMod val="50000"/>
+                      <a:alpha val="15000"/>
+                    </a:schemeClr>
+                  </a:solidFill>
+                </a:ln>
+                <a:solidFill>
+                  <a:schemeClr val="bg2">
+                    <a:lumMod val="50000"/>
+                  </a:schemeClr>
+                </a:solidFill>
+                <a:latin typeface="나눔스퀘어" panose="020B0600000101010101" pitchFamily="50" charset="-127"/>
+                <a:ea typeface="나눔스퀘어" panose="020B0600000101010101" pitchFamily="50" charset="-127"/>
+                <a:cs typeface="조선일보명조" panose="02030304000000000000" pitchFamily="18" charset="-127"/>
+              </a:rPr>
+              <a:t>차량 등록 현황</a:t>
+            </a:r>
+            <a:endParaRPr lang="en-US" altLang="ko-KR" sz="1600" dirty="0">
+              <a:ln>
+                <a:solidFill>
+                  <a:schemeClr val="bg2">
+                    <a:lumMod val="50000"/>
+                    <a:alpha val="15000"/>
+                  </a:schemeClr>
+                </a:solidFill>
+              </a:ln>
+              <a:solidFill>
+                <a:schemeClr val="bg2">
+                  <a:lumMod val="50000"/>
+                </a:schemeClr>
+              </a:solidFill>
+              <a:latin typeface="나눔스퀘어" panose="020B0600000101010101" pitchFamily="50" charset="-127"/>
+              <a:ea typeface="나눔스퀘어" panose="020B0600000101010101" pitchFamily="50" charset="-127"/>
+              <a:cs typeface="조선일보명조" panose="02030304000000000000" pitchFamily="18" charset="-127"/>
+            </a:endParaRPr>
+          </a:p>
+          <a:p>
+            <a:pPr marL="342900" indent="-342900">
+              <a:lnSpc>
+                <a:spcPct val="150000"/>
+              </a:lnSpc>
+              <a:buFont typeface="+mj-lt"/>
+              <a:buAutoNum type="arabicPeriod"/>
+            </a:pPr>
+            <a:r>
+              <a:rPr lang="ko-KR" altLang="en-US" sz="1600" dirty="0">
+                <a:ln>
+                  <a:solidFill>
+                    <a:schemeClr val="bg2">
+                      <a:lumMod val="50000"/>
+                      <a:alpha val="15000"/>
+                    </a:schemeClr>
+                  </a:solidFill>
+                </a:ln>
+                <a:solidFill>
+                  <a:schemeClr val="bg2">
+                    <a:lumMod val="50000"/>
+                  </a:schemeClr>
+                </a:solidFill>
+                <a:latin typeface="나눔스퀘어" panose="020B0600000101010101" pitchFamily="50" charset="-127"/>
+                <a:ea typeface="나눔스퀘어" panose="020B0600000101010101" pitchFamily="50" charset="-127"/>
+                <a:cs typeface="조선일보명조" panose="02030304000000000000" pitchFamily="18" charset="-127"/>
+              </a:rPr>
+              <a:t>고속도로 통행량</a:t>
+            </a:r>
+            <a:r>
+              <a:rPr lang="en-US" altLang="ko-KR" sz="1600" dirty="0">
+                <a:ln>
+                  <a:solidFill>
+                    <a:schemeClr val="bg2">
+                      <a:lumMod val="50000"/>
+                      <a:alpha val="15000"/>
+                    </a:schemeClr>
+                  </a:solidFill>
+                </a:ln>
+                <a:solidFill>
+                  <a:schemeClr val="bg2">
+                    <a:lumMod val="50000"/>
+                  </a:schemeClr>
+                </a:solidFill>
+                <a:latin typeface="나눔스퀘어" panose="020B0600000101010101" pitchFamily="50" charset="-127"/>
+                <a:ea typeface="나눔스퀘어" panose="020B0600000101010101" pitchFamily="50" charset="-127"/>
+                <a:cs typeface="조선일보명조" panose="02030304000000000000" pitchFamily="18" charset="-127"/>
+              </a:rPr>
+              <a:t>(</a:t>
+            </a:r>
+            <a:r>
+              <a:rPr lang="ko-KR" altLang="en-US" sz="1600" dirty="0" err="1">
+                <a:ln>
+                  <a:solidFill>
+                    <a:schemeClr val="bg2">
+                      <a:lumMod val="50000"/>
+                      <a:alpha val="15000"/>
+                    </a:schemeClr>
+                  </a:solidFill>
+                </a:ln>
+                <a:solidFill>
+                  <a:schemeClr val="bg2">
+                    <a:lumMod val="50000"/>
+                  </a:schemeClr>
+                </a:solidFill>
+                <a:latin typeface="나눔스퀘어" panose="020B0600000101010101" pitchFamily="50" charset="-127"/>
+                <a:ea typeface="나눔스퀘어" panose="020B0600000101010101" pitchFamily="50" charset="-127"/>
+                <a:cs typeface="조선일보명조" panose="02030304000000000000" pitchFamily="18" charset="-127"/>
+              </a:rPr>
+              <a:t>도시별</a:t>
+            </a:r>
+            <a:r>
+              <a:rPr lang="ko-KR" altLang="en-US" sz="1600" dirty="0">
+                <a:ln>
+                  <a:solidFill>
+                    <a:schemeClr val="bg2">
+                      <a:lumMod val="50000"/>
+                      <a:alpha val="15000"/>
+                    </a:schemeClr>
+                  </a:solidFill>
+                </a:ln>
+                <a:solidFill>
+                  <a:schemeClr val="bg2">
+                    <a:lumMod val="50000"/>
+                  </a:schemeClr>
+                </a:solidFill>
+                <a:latin typeface="나눔스퀘어" panose="020B0600000101010101" pitchFamily="50" charset="-127"/>
+                <a:ea typeface="나눔스퀘어" panose="020B0600000101010101" pitchFamily="50" charset="-127"/>
+                <a:cs typeface="조선일보명조" panose="02030304000000000000" pitchFamily="18" charset="-127"/>
+              </a:rPr>
+              <a:t> 물류 이동 현황</a:t>
+            </a:r>
+            <a:r>
+              <a:rPr lang="en-US" altLang="ko-KR" sz="1600" dirty="0">
+                <a:ln>
+                  <a:solidFill>
+                    <a:schemeClr val="bg2">
+                      <a:lumMod val="50000"/>
+                      <a:alpha val="15000"/>
+                    </a:schemeClr>
+                  </a:solidFill>
+                </a:ln>
+                <a:solidFill>
+                  <a:schemeClr val="bg2">
+                    <a:lumMod val="50000"/>
+                  </a:schemeClr>
+                </a:solidFill>
+                <a:latin typeface="나눔스퀘어" panose="020B0600000101010101" pitchFamily="50" charset="-127"/>
+                <a:ea typeface="나눔스퀘어" panose="020B0600000101010101" pitchFamily="50" charset="-127"/>
+                <a:cs typeface="조선일보명조" panose="02030304000000000000" pitchFamily="18" charset="-127"/>
+              </a:rPr>
+              <a:t>)</a:t>
+            </a:r>
+          </a:p>
+          <a:p>
+            <a:pPr marL="800100" lvl="1" indent="-342900">
+              <a:lnSpc>
+                <a:spcPct val="150000"/>
+              </a:lnSpc>
+              <a:buFont typeface="Arial" panose="020B0604020202020204" pitchFamily="34" charset="0"/>
+              <a:buChar char="•"/>
+            </a:pPr>
+            <a:r>
+              <a:rPr lang="en-US" altLang="ko-KR" sz="1600" dirty="0">
+                <a:ln>
+                  <a:solidFill>
+                    <a:schemeClr val="bg2">
+                      <a:lumMod val="50000"/>
+                      <a:alpha val="15000"/>
+                    </a:schemeClr>
+                  </a:solidFill>
+                </a:ln>
+                <a:solidFill>
+                  <a:schemeClr val="bg2">
+                    <a:lumMod val="50000"/>
+                  </a:schemeClr>
+                </a:solidFill>
+                <a:latin typeface="나눔스퀘어" panose="020B0600000101010101" pitchFamily="50" charset="-127"/>
+                <a:ea typeface="나눔스퀘어" panose="020B0600000101010101" pitchFamily="50" charset="-127"/>
+                <a:cs typeface="조선일보명조" panose="02030304000000000000" pitchFamily="18" charset="-127"/>
+              </a:rPr>
+              <a:t>3</a:t>
+            </a:r>
+            <a:r>
+              <a:rPr lang="ko-KR" altLang="en-US" sz="1600" dirty="0">
+                <a:ln>
+                  <a:solidFill>
+                    <a:schemeClr val="bg2">
+                      <a:lumMod val="50000"/>
+                      <a:alpha val="15000"/>
+                    </a:schemeClr>
+                  </a:solidFill>
+                </a:ln>
+                <a:solidFill>
+                  <a:schemeClr val="bg2">
+                    <a:lumMod val="50000"/>
+                  </a:schemeClr>
+                </a:solidFill>
+                <a:latin typeface="나눔스퀘어" panose="020B0600000101010101" pitchFamily="50" charset="-127"/>
+                <a:ea typeface="나눔스퀘어" panose="020B0600000101010101" pitchFamily="50" charset="-127"/>
+                <a:cs typeface="조선일보명조" panose="02030304000000000000" pitchFamily="18" charset="-127"/>
+              </a:rPr>
+              <a:t>종  이상 트럭만 취급</a:t>
+            </a:r>
+            <a:endParaRPr lang="en-US" altLang="ko-KR" sz="1600" dirty="0">
+              <a:ln>
+                <a:solidFill>
+                  <a:schemeClr val="bg2">
+                    <a:lumMod val="50000"/>
+                    <a:alpha val="15000"/>
+                  </a:schemeClr>
+                </a:solidFill>
+              </a:ln>
+              <a:solidFill>
+                <a:schemeClr val="bg2">
+                  <a:lumMod val="50000"/>
+                </a:schemeClr>
+              </a:solidFill>
+              <a:latin typeface="나눔스퀘어" panose="020B0600000101010101" pitchFamily="50" charset="-127"/>
+              <a:ea typeface="나눔스퀘어" panose="020B0600000101010101" pitchFamily="50" charset="-127"/>
+              <a:cs typeface="조선일보명조" panose="02030304000000000000" pitchFamily="18" charset="-127"/>
+            </a:endParaRPr>
+          </a:p>
+          <a:p>
+            <a:pPr marL="342900" indent="-342900">
+              <a:lnSpc>
+                <a:spcPct val="150000"/>
+              </a:lnSpc>
+              <a:buFont typeface="+mj-lt"/>
+              <a:buAutoNum type="arabicPeriod"/>
+            </a:pPr>
+            <a:r>
+              <a:rPr lang="ko-KR" altLang="en-US" sz="1600" dirty="0" err="1">
+                <a:ln>
+                  <a:solidFill>
+                    <a:schemeClr val="bg2">
+                      <a:lumMod val="50000"/>
+                      <a:alpha val="15000"/>
+                    </a:schemeClr>
+                  </a:solidFill>
+                </a:ln>
+                <a:solidFill>
+                  <a:schemeClr val="bg2">
+                    <a:lumMod val="50000"/>
+                  </a:schemeClr>
+                </a:solidFill>
+                <a:latin typeface="나눔스퀘어" panose="020B0600000101010101" pitchFamily="50" charset="-127"/>
+                <a:ea typeface="나눔스퀘어" panose="020B0600000101010101" pitchFamily="50" charset="-127"/>
+                <a:cs typeface="조선일보명조" panose="02030304000000000000" pitchFamily="18" charset="-127"/>
+              </a:rPr>
+              <a:t>요소수</a:t>
+            </a:r>
+            <a:r>
+              <a:rPr lang="ko-KR" altLang="en-US" sz="1600" dirty="0">
+                <a:ln>
+                  <a:solidFill>
+                    <a:schemeClr val="bg2">
+                      <a:lumMod val="50000"/>
+                      <a:alpha val="15000"/>
+                    </a:schemeClr>
+                  </a:solidFill>
+                </a:ln>
+                <a:solidFill>
+                  <a:schemeClr val="bg2">
+                    <a:lumMod val="50000"/>
+                  </a:schemeClr>
+                </a:solidFill>
+                <a:latin typeface="나눔스퀘어" panose="020B0600000101010101" pitchFamily="50" charset="-127"/>
+                <a:ea typeface="나눔스퀘어" panose="020B0600000101010101" pitchFamily="50" charset="-127"/>
+                <a:cs typeface="조선일보명조" panose="02030304000000000000" pitchFamily="18" charset="-127"/>
+              </a:rPr>
+              <a:t> 중점 유통 주유소 재고 현황</a:t>
+            </a:r>
+            <a:endParaRPr lang="en-US" altLang="ko-KR" sz="1600" dirty="0">
+              <a:ln>
+                <a:solidFill>
+                  <a:schemeClr val="bg2">
+                    <a:lumMod val="50000"/>
+                    <a:alpha val="15000"/>
+                  </a:schemeClr>
+                </a:solidFill>
+              </a:ln>
+              <a:solidFill>
+                <a:schemeClr val="bg2">
+                  <a:lumMod val="50000"/>
+                </a:schemeClr>
+              </a:solidFill>
+              <a:latin typeface="나눔스퀘어" panose="020B0600000101010101" pitchFamily="50" charset="-127"/>
+              <a:ea typeface="나눔스퀘어" panose="020B0600000101010101" pitchFamily="50" charset="-127"/>
+              <a:cs typeface="조선일보명조" panose="02030304000000000000" pitchFamily="18" charset="-127"/>
+            </a:endParaRPr>
+          </a:p>
+          <a:p>
+            <a:pPr marL="342900" indent="-342900">
+              <a:lnSpc>
+                <a:spcPct val="150000"/>
+              </a:lnSpc>
+              <a:buFont typeface="+mj-lt"/>
+              <a:buAutoNum type="arabicPeriod"/>
+            </a:pPr>
+            <a:r>
+              <a:rPr lang="ko-KR" altLang="en-US" sz="1600" dirty="0">
+                <a:ln>
+                  <a:solidFill>
+                    <a:schemeClr val="bg2">
+                      <a:lumMod val="50000"/>
+                      <a:alpha val="15000"/>
+                    </a:schemeClr>
+                  </a:solidFill>
+                </a:ln>
+                <a:solidFill>
+                  <a:schemeClr val="bg2">
+                    <a:lumMod val="50000"/>
+                  </a:schemeClr>
+                </a:solidFill>
+                <a:latin typeface="나눔스퀘어" panose="020B0600000101010101" pitchFamily="50" charset="-127"/>
+                <a:ea typeface="나눔스퀘어" panose="020B0600000101010101" pitchFamily="50" charset="-127"/>
+                <a:cs typeface="조선일보명조" panose="02030304000000000000" pitchFamily="18" charset="-127"/>
+              </a:rPr>
+              <a:t>전국 물류 창고업 현황</a:t>
+            </a:r>
+          </a:p>
+        </p:txBody>
+      </p:sp>
+      <p:sp>
+        <p:nvSpPr>
+          <p:cNvPr id="12" name="TextBox 11">
+            <a:extLst>
+              <a:ext uri="{FF2B5EF4-FFF2-40B4-BE49-F238E27FC236}">
+                <a16:creationId xmlns:a16="http://schemas.microsoft.com/office/drawing/2014/main" id="{1721E9ED-B670-4E2E-B32A-EDDD9E3A6516}"/>
+              </a:ext>
+            </a:extLst>
+          </p:cNvPr>
+          <p:cNvSpPr txBox="1"/>
+          <p:nvPr/>
+        </p:nvSpPr>
+        <p:spPr>
+          <a:xfrm>
+            <a:off x="439779" y="4625669"/>
+            <a:ext cx="5446113" cy="783356"/>
+          </a:xfrm>
+          <a:prstGeom prst="rect">
+            <a:avLst/>
+          </a:prstGeom>
+          <a:noFill/>
+        </p:spPr>
+        <p:txBody>
+          <a:bodyPr wrap="square" rtlCol="0">
+            <a:spAutoFit/>
+          </a:bodyPr>
+          <a:lstStyle/>
+          <a:p>
+            <a:pPr>
+              <a:lnSpc>
+                <a:spcPct val="150000"/>
+              </a:lnSpc>
+            </a:pPr>
+            <a:r>
+              <a:rPr lang="en-US" altLang="ko-KR" sz="1600" dirty="0">
+                <a:ln>
+                  <a:solidFill>
+                    <a:schemeClr val="bg2">
+                      <a:lumMod val="50000"/>
+                      <a:alpha val="15000"/>
+                    </a:schemeClr>
+                  </a:solidFill>
+                </a:ln>
+                <a:solidFill>
+                  <a:schemeClr val="bg2">
+                    <a:lumMod val="50000"/>
+                  </a:schemeClr>
+                </a:solidFill>
+                <a:latin typeface="나눔스퀘어" panose="020B0600000101010101" pitchFamily="50" charset="-127"/>
+                <a:ea typeface="나눔스퀘어" panose="020B0600000101010101" pitchFamily="50" charset="-127"/>
+                <a:cs typeface="조선일보명조" panose="02030304000000000000" pitchFamily="18" charset="-127"/>
+              </a:rPr>
+              <a:t>7</a:t>
+            </a:r>
+            <a:r>
+              <a:rPr lang="ko-KR" altLang="en-US" sz="1600" dirty="0">
+                <a:ln>
+                  <a:solidFill>
+                    <a:schemeClr val="bg2">
+                      <a:lumMod val="50000"/>
+                      <a:alpha val="15000"/>
+                    </a:schemeClr>
+                  </a:solidFill>
+                </a:ln>
+                <a:solidFill>
+                  <a:schemeClr val="bg2">
+                    <a:lumMod val="50000"/>
+                  </a:schemeClr>
+                </a:solidFill>
+                <a:latin typeface="나눔스퀘어" panose="020B0600000101010101" pitchFamily="50" charset="-127"/>
+                <a:ea typeface="나눔스퀘어" panose="020B0600000101010101" pitchFamily="50" charset="-127"/>
+                <a:cs typeface="조선일보명조" panose="02030304000000000000" pitchFamily="18" charset="-127"/>
+              </a:rPr>
+              <a:t>개 지역</a:t>
+            </a:r>
+            <a:r>
+              <a:rPr lang="en-US" altLang="ko-KR" sz="1600" dirty="0">
+                <a:ln>
+                  <a:solidFill>
+                    <a:schemeClr val="bg2">
+                      <a:lumMod val="50000"/>
+                      <a:alpha val="15000"/>
+                    </a:schemeClr>
+                  </a:solidFill>
+                </a:ln>
+                <a:solidFill>
+                  <a:schemeClr val="bg2">
+                    <a:lumMod val="50000"/>
+                  </a:schemeClr>
+                </a:solidFill>
+                <a:latin typeface="나눔스퀘어" panose="020B0600000101010101" pitchFamily="50" charset="-127"/>
+                <a:ea typeface="나눔스퀘어" panose="020B0600000101010101" pitchFamily="50" charset="-127"/>
+                <a:cs typeface="조선일보명조" panose="02030304000000000000" pitchFamily="18" charset="-127"/>
+              </a:rPr>
+              <a:t>(</a:t>
+            </a:r>
+            <a:r>
+              <a:rPr lang="ko-KR" altLang="en-US" sz="1600" dirty="0">
+                <a:ln>
+                  <a:solidFill>
+                    <a:schemeClr val="bg2">
+                      <a:lumMod val="50000"/>
+                      <a:alpha val="15000"/>
+                    </a:schemeClr>
+                  </a:solidFill>
+                </a:ln>
+                <a:solidFill>
+                  <a:schemeClr val="bg2">
+                    <a:lumMod val="50000"/>
+                  </a:schemeClr>
+                </a:solidFill>
+                <a:latin typeface="나눔스퀘어" panose="020B0600000101010101" pitchFamily="50" charset="-127"/>
+                <a:ea typeface="나눔스퀘어" panose="020B0600000101010101" pitchFamily="50" charset="-127"/>
+                <a:cs typeface="조선일보명조" panose="02030304000000000000" pitchFamily="18" charset="-127"/>
+              </a:rPr>
+              <a:t>수도권</a:t>
+            </a:r>
+            <a:r>
+              <a:rPr lang="en-US" altLang="ko-KR" sz="1600" dirty="0">
+                <a:ln>
+                  <a:solidFill>
+                    <a:schemeClr val="bg2">
+                      <a:lumMod val="50000"/>
+                      <a:alpha val="15000"/>
+                    </a:schemeClr>
+                  </a:solidFill>
+                </a:ln>
+                <a:solidFill>
+                  <a:schemeClr val="bg2">
+                    <a:lumMod val="50000"/>
+                  </a:schemeClr>
+                </a:solidFill>
+                <a:latin typeface="나눔스퀘어" panose="020B0600000101010101" pitchFamily="50" charset="-127"/>
+                <a:ea typeface="나눔스퀘어" panose="020B0600000101010101" pitchFamily="50" charset="-127"/>
+                <a:cs typeface="조선일보명조" panose="02030304000000000000" pitchFamily="18" charset="-127"/>
+              </a:rPr>
+              <a:t>, </a:t>
+            </a:r>
+            <a:r>
+              <a:rPr lang="ko-KR" altLang="en-US" sz="1600" dirty="0">
+                <a:ln>
+                  <a:solidFill>
+                    <a:schemeClr val="bg2">
+                      <a:lumMod val="50000"/>
+                      <a:alpha val="15000"/>
+                    </a:schemeClr>
+                  </a:solidFill>
+                </a:ln>
+                <a:solidFill>
+                  <a:schemeClr val="bg2">
+                    <a:lumMod val="50000"/>
+                  </a:schemeClr>
+                </a:solidFill>
+                <a:latin typeface="나눔스퀘어" panose="020B0600000101010101" pitchFamily="50" charset="-127"/>
+                <a:ea typeface="나눔스퀘어" panose="020B0600000101010101" pitchFamily="50" charset="-127"/>
+                <a:cs typeface="조선일보명조" panose="02030304000000000000" pitchFamily="18" charset="-127"/>
+              </a:rPr>
+              <a:t>강원</a:t>
+            </a:r>
+            <a:r>
+              <a:rPr lang="en-US" altLang="ko-KR" sz="1600" dirty="0">
+                <a:ln>
+                  <a:solidFill>
+                    <a:schemeClr val="bg2">
+                      <a:lumMod val="50000"/>
+                      <a:alpha val="15000"/>
+                    </a:schemeClr>
+                  </a:solidFill>
+                </a:ln>
+                <a:solidFill>
+                  <a:schemeClr val="bg2">
+                    <a:lumMod val="50000"/>
+                  </a:schemeClr>
+                </a:solidFill>
+                <a:latin typeface="나눔스퀘어" panose="020B0600000101010101" pitchFamily="50" charset="-127"/>
+                <a:ea typeface="나눔스퀘어" panose="020B0600000101010101" pitchFamily="50" charset="-127"/>
+                <a:cs typeface="조선일보명조" panose="02030304000000000000" pitchFamily="18" charset="-127"/>
+              </a:rPr>
+              <a:t>, </a:t>
+            </a:r>
+            <a:r>
+              <a:rPr lang="ko-KR" altLang="en-US" sz="1600" dirty="0" err="1">
+                <a:ln>
+                  <a:solidFill>
+                    <a:schemeClr val="bg2">
+                      <a:lumMod val="50000"/>
+                      <a:alpha val="15000"/>
+                    </a:schemeClr>
+                  </a:solidFill>
+                </a:ln>
+                <a:solidFill>
+                  <a:schemeClr val="bg2">
+                    <a:lumMod val="50000"/>
+                  </a:schemeClr>
+                </a:solidFill>
+                <a:latin typeface="나눔스퀘어" panose="020B0600000101010101" pitchFamily="50" charset="-127"/>
+                <a:ea typeface="나눔스퀘어" panose="020B0600000101010101" pitchFamily="50" charset="-127"/>
+                <a:cs typeface="조선일보명조" panose="02030304000000000000" pitchFamily="18" charset="-127"/>
+              </a:rPr>
+              <a:t>대전충청</a:t>
+            </a:r>
+            <a:r>
+              <a:rPr lang="en-US" altLang="ko-KR" sz="1600" dirty="0">
+                <a:ln>
+                  <a:solidFill>
+                    <a:schemeClr val="bg2">
+                      <a:lumMod val="50000"/>
+                      <a:alpha val="15000"/>
+                    </a:schemeClr>
+                  </a:solidFill>
+                </a:ln>
+                <a:solidFill>
+                  <a:schemeClr val="bg2">
+                    <a:lumMod val="50000"/>
+                  </a:schemeClr>
+                </a:solidFill>
+                <a:latin typeface="나눔스퀘어" panose="020B0600000101010101" pitchFamily="50" charset="-127"/>
+                <a:ea typeface="나눔스퀘어" panose="020B0600000101010101" pitchFamily="50" charset="-127"/>
+                <a:cs typeface="조선일보명조" panose="02030304000000000000" pitchFamily="18" charset="-127"/>
+              </a:rPr>
+              <a:t>, </a:t>
+            </a:r>
+            <a:r>
+              <a:rPr lang="ko-KR" altLang="en-US" sz="1600" dirty="0">
+                <a:ln>
+                  <a:solidFill>
+                    <a:schemeClr val="bg2">
+                      <a:lumMod val="50000"/>
+                      <a:alpha val="15000"/>
+                    </a:schemeClr>
+                  </a:solidFill>
+                </a:ln>
+                <a:solidFill>
+                  <a:schemeClr val="bg2">
+                    <a:lumMod val="50000"/>
+                  </a:schemeClr>
+                </a:solidFill>
+                <a:latin typeface="나눔스퀘어" panose="020B0600000101010101" pitchFamily="50" charset="-127"/>
+                <a:ea typeface="나눔스퀘어" panose="020B0600000101010101" pitchFamily="50" charset="-127"/>
+                <a:cs typeface="조선일보명조" panose="02030304000000000000" pitchFamily="18" charset="-127"/>
+              </a:rPr>
+              <a:t>전북</a:t>
+            </a:r>
+            <a:r>
+              <a:rPr lang="en-US" altLang="ko-KR" sz="1600" dirty="0">
+                <a:ln>
+                  <a:solidFill>
+                    <a:schemeClr val="bg2">
+                      <a:lumMod val="50000"/>
+                      <a:alpha val="15000"/>
+                    </a:schemeClr>
+                  </a:solidFill>
+                </a:ln>
+                <a:solidFill>
+                  <a:schemeClr val="bg2">
+                    <a:lumMod val="50000"/>
+                  </a:schemeClr>
+                </a:solidFill>
+                <a:latin typeface="나눔스퀘어" panose="020B0600000101010101" pitchFamily="50" charset="-127"/>
+                <a:ea typeface="나눔스퀘어" panose="020B0600000101010101" pitchFamily="50" charset="-127"/>
+                <a:cs typeface="조선일보명조" panose="02030304000000000000" pitchFamily="18" charset="-127"/>
+              </a:rPr>
+              <a:t>, </a:t>
+            </a:r>
+            <a:r>
+              <a:rPr lang="ko-KR" altLang="en-US" sz="1600" dirty="0">
+                <a:ln>
+                  <a:solidFill>
+                    <a:schemeClr val="bg2">
+                      <a:lumMod val="50000"/>
+                      <a:alpha val="15000"/>
+                    </a:schemeClr>
+                  </a:solidFill>
+                </a:ln>
+                <a:solidFill>
+                  <a:schemeClr val="bg2">
+                    <a:lumMod val="50000"/>
+                  </a:schemeClr>
+                </a:solidFill>
+                <a:latin typeface="나눔스퀘어" panose="020B0600000101010101" pitchFamily="50" charset="-127"/>
+                <a:ea typeface="나눔스퀘어" panose="020B0600000101010101" pitchFamily="50" charset="-127"/>
+                <a:cs typeface="조선일보명조" panose="02030304000000000000" pitchFamily="18" charset="-127"/>
+              </a:rPr>
+              <a:t>대구경북</a:t>
+            </a:r>
+            <a:r>
+              <a:rPr lang="en-US" altLang="ko-KR" sz="1600" dirty="0">
+                <a:ln>
+                  <a:solidFill>
+                    <a:schemeClr val="bg2">
+                      <a:lumMod val="50000"/>
+                      <a:alpha val="15000"/>
+                    </a:schemeClr>
+                  </a:solidFill>
+                </a:ln>
+                <a:solidFill>
+                  <a:schemeClr val="bg2">
+                    <a:lumMod val="50000"/>
+                  </a:schemeClr>
+                </a:solidFill>
+                <a:latin typeface="나눔스퀘어" panose="020B0600000101010101" pitchFamily="50" charset="-127"/>
+                <a:ea typeface="나눔스퀘어" panose="020B0600000101010101" pitchFamily="50" charset="-127"/>
+                <a:cs typeface="조선일보명조" panose="02030304000000000000" pitchFamily="18" charset="-127"/>
+              </a:rPr>
+              <a:t>, </a:t>
+            </a:r>
+            <a:r>
+              <a:rPr lang="ko-KR" altLang="en-US" sz="1600" dirty="0">
+                <a:ln>
+                  <a:solidFill>
+                    <a:schemeClr val="bg2">
+                      <a:lumMod val="50000"/>
+                      <a:alpha val="15000"/>
+                    </a:schemeClr>
+                  </a:solidFill>
+                </a:ln>
+                <a:solidFill>
+                  <a:schemeClr val="bg2">
+                    <a:lumMod val="50000"/>
+                  </a:schemeClr>
+                </a:solidFill>
+                <a:latin typeface="나눔스퀘어" panose="020B0600000101010101" pitchFamily="50" charset="-127"/>
+                <a:ea typeface="나눔스퀘어" panose="020B0600000101010101" pitchFamily="50" charset="-127"/>
+                <a:cs typeface="조선일보명조" panose="02030304000000000000" pitchFamily="18" charset="-127"/>
+              </a:rPr>
+              <a:t>광주전남</a:t>
+            </a:r>
+            <a:r>
+              <a:rPr lang="en-US" altLang="ko-KR" sz="1600" dirty="0">
+                <a:ln>
+                  <a:solidFill>
+                    <a:schemeClr val="bg2">
+                      <a:lumMod val="50000"/>
+                      <a:alpha val="15000"/>
+                    </a:schemeClr>
+                  </a:solidFill>
+                </a:ln>
+                <a:solidFill>
+                  <a:schemeClr val="bg2">
+                    <a:lumMod val="50000"/>
+                  </a:schemeClr>
+                </a:solidFill>
+                <a:latin typeface="나눔스퀘어" panose="020B0600000101010101" pitchFamily="50" charset="-127"/>
+                <a:ea typeface="나눔스퀘어" panose="020B0600000101010101" pitchFamily="50" charset="-127"/>
+                <a:cs typeface="조선일보명조" panose="02030304000000000000" pitchFamily="18" charset="-127"/>
+              </a:rPr>
+              <a:t>, </a:t>
+            </a:r>
+            <a:r>
+              <a:rPr lang="ko-KR" altLang="en-US" sz="1600" dirty="0">
+                <a:ln>
+                  <a:solidFill>
+                    <a:schemeClr val="bg2">
+                      <a:lumMod val="50000"/>
+                      <a:alpha val="15000"/>
+                    </a:schemeClr>
+                  </a:solidFill>
+                </a:ln>
+                <a:solidFill>
+                  <a:schemeClr val="bg2">
+                    <a:lumMod val="50000"/>
+                  </a:schemeClr>
+                </a:solidFill>
+                <a:latin typeface="나눔스퀘어" panose="020B0600000101010101" pitchFamily="50" charset="-127"/>
+                <a:ea typeface="나눔스퀘어" panose="020B0600000101010101" pitchFamily="50" charset="-127"/>
+                <a:cs typeface="조선일보명조" panose="02030304000000000000" pitchFamily="18" charset="-127"/>
+              </a:rPr>
+              <a:t>부산경남</a:t>
+            </a:r>
+            <a:r>
+              <a:rPr lang="en-US" altLang="ko-KR" sz="1600" dirty="0">
+                <a:ln>
+                  <a:solidFill>
+                    <a:schemeClr val="bg2">
+                      <a:lumMod val="50000"/>
+                      <a:alpha val="15000"/>
+                    </a:schemeClr>
+                  </a:solidFill>
+                </a:ln>
+                <a:solidFill>
+                  <a:schemeClr val="bg2">
+                    <a:lumMod val="50000"/>
+                  </a:schemeClr>
+                </a:solidFill>
+                <a:latin typeface="나눔스퀘어" panose="020B0600000101010101" pitchFamily="50" charset="-127"/>
+                <a:ea typeface="나눔스퀘어" panose="020B0600000101010101" pitchFamily="50" charset="-127"/>
+                <a:cs typeface="조선일보명조" panose="02030304000000000000" pitchFamily="18" charset="-127"/>
+              </a:rPr>
+              <a:t>)</a:t>
+            </a:r>
+            <a:r>
+              <a:rPr lang="ko-KR" altLang="en-US" sz="1600" dirty="0">
+                <a:ln>
+                  <a:solidFill>
+                    <a:schemeClr val="bg2">
+                      <a:lumMod val="50000"/>
+                      <a:alpha val="15000"/>
+                    </a:schemeClr>
+                  </a:solidFill>
+                </a:ln>
+                <a:solidFill>
+                  <a:schemeClr val="bg2">
+                    <a:lumMod val="50000"/>
+                  </a:schemeClr>
+                </a:solidFill>
+                <a:latin typeface="나눔스퀘어" panose="020B0600000101010101" pitchFamily="50" charset="-127"/>
+                <a:ea typeface="나눔스퀘어" panose="020B0600000101010101" pitchFamily="50" charset="-127"/>
+                <a:cs typeface="조선일보명조" panose="02030304000000000000" pitchFamily="18" charset="-127"/>
+              </a:rPr>
+              <a:t>을 기준으로 하나의 데이터셋으로 병합</a:t>
+            </a:r>
+          </a:p>
+        </p:txBody>
+      </p:sp>
+      <p:sp>
+        <p:nvSpPr>
+          <p:cNvPr id="2" name="화살표: 아래쪽 1">
+            <a:extLst>
+              <a:ext uri="{FF2B5EF4-FFF2-40B4-BE49-F238E27FC236}">
+                <a16:creationId xmlns:a16="http://schemas.microsoft.com/office/drawing/2014/main" id="{4F2F07A9-C6CC-4645-A5F3-0C7902BB9A30}"/>
+              </a:ext>
+            </a:extLst>
+          </p:cNvPr>
+          <p:cNvSpPr/>
+          <p:nvPr/>
+        </p:nvSpPr>
+        <p:spPr>
+          <a:xfrm>
+            <a:off x="2627791" y="3817403"/>
+            <a:ext cx="745722" cy="659263"/>
+          </a:xfrm>
+          <a:prstGeom prst="downArrow">
+            <a:avLst/>
+          </a:prstGeom>
+          <a:solidFill>
+            <a:srgbClr val="152B39"/>
+          </a:solidFill>
+          <a:ln>
+            <a:solidFill>
+              <a:srgbClr val="152B39"/>
+            </a:solidFill>
+          </a:ln>
+        </p:spPr>
+        <p:style>
+          <a:lnRef idx="0">
+            <a:schemeClr val="accent5"/>
+          </a:lnRef>
+          <a:fillRef idx="3">
+            <a:schemeClr val="accent5"/>
+          </a:fillRef>
+          <a:effectRef idx="3">
+            <a:schemeClr val="accent5"/>
+          </a:effectRef>
+          <a:fontRef idx="minor">
+            <a:schemeClr val="lt1"/>
+          </a:fontRef>
+        </p:style>
+        <p:txBody>
+          <a:bodyPr rtlCol="0" anchor="ctr"/>
+          <a:lstStyle/>
+          <a:p>
+            <a:pPr algn="ctr"/>
+            <a:endParaRPr lang="ko-KR" altLang="en-US" dirty="0"/>
+          </a:p>
+        </p:txBody>
+      </p:sp>
+      <mc:AlternateContent xmlns:mc="http://schemas.openxmlformats.org/markup-compatibility/2006">
+        <mc:Choice xmlns:a14="http://schemas.microsoft.com/office/drawing/2010/main" Requires="a14">
+          <p:sp>
+            <p:nvSpPr>
+              <p:cNvPr id="15" name="TextBox 14">
+                <a:extLst>
+                  <a:ext uri="{FF2B5EF4-FFF2-40B4-BE49-F238E27FC236}">
+                    <a16:creationId xmlns:a16="http://schemas.microsoft.com/office/drawing/2014/main" id="{DE2B6FF6-ECA4-44AB-AA27-2193DB652C8B}"/>
+                  </a:ext>
+                </a:extLst>
+              </p:cNvPr>
+              <p:cNvSpPr txBox="1"/>
+              <p:nvPr/>
+            </p:nvSpPr>
+            <p:spPr>
+              <a:xfrm>
+                <a:off x="6489581" y="1754848"/>
+                <a:ext cx="5446113" cy="4110036"/>
+              </a:xfrm>
+              <a:prstGeom prst="rect">
+                <a:avLst/>
+              </a:prstGeom>
+              <a:noFill/>
+            </p:spPr>
+            <p:txBody>
+              <a:bodyPr wrap="square" rtlCol="0">
+                <a:spAutoFit/>
+              </a:bodyPr>
+              <a:lstStyle/>
+              <a:p>
+                <a:pPr>
+                  <a:lnSpc>
+                    <a:spcPct val="150000"/>
+                  </a:lnSpc>
+                </a:pPr>
+                <a:r>
+                  <a:rPr lang="en-US" altLang="ko-KR" sz="1600" dirty="0">
+                    <a:ln>
+                      <a:solidFill>
+                        <a:schemeClr val="bg2">
+                          <a:lumMod val="50000"/>
+                          <a:alpha val="15000"/>
+                        </a:schemeClr>
+                      </a:solidFill>
+                    </a:ln>
+                    <a:solidFill>
+                      <a:schemeClr val="bg2">
+                        <a:lumMod val="50000"/>
+                      </a:schemeClr>
+                    </a:solidFill>
+                    <a:latin typeface="나눔스퀘어" panose="020B0600000101010101" pitchFamily="50" charset="-127"/>
+                    <a:ea typeface="나눔스퀘어" panose="020B0600000101010101" pitchFamily="50" charset="-127"/>
+                    <a:cs typeface="조선일보명조" panose="02030304000000000000" pitchFamily="18" charset="-127"/>
+                  </a:rPr>
+                  <a:t>Step</a:t>
+                </a:r>
+                <a:r>
+                  <a:rPr lang="ko-KR" altLang="en-US" sz="1600" dirty="0">
+                    <a:ln>
+                      <a:solidFill>
+                        <a:schemeClr val="bg2">
+                          <a:lumMod val="50000"/>
+                          <a:alpha val="15000"/>
+                        </a:schemeClr>
+                      </a:solidFill>
+                    </a:ln>
+                    <a:solidFill>
+                      <a:schemeClr val="bg2">
+                        <a:lumMod val="50000"/>
+                      </a:schemeClr>
+                    </a:solidFill>
+                    <a:latin typeface="나눔스퀘어" panose="020B0600000101010101" pitchFamily="50" charset="-127"/>
+                    <a:ea typeface="나눔스퀘어" panose="020B0600000101010101" pitchFamily="50" charset="-127"/>
+                    <a:cs typeface="조선일보명조" panose="02030304000000000000" pitchFamily="18" charset="-127"/>
+                  </a:rPr>
+                  <a:t> </a:t>
+                </a:r>
+                <a:r>
+                  <a:rPr lang="en-US" altLang="ko-KR" sz="1600" dirty="0">
+                    <a:ln>
+                      <a:solidFill>
+                        <a:schemeClr val="bg2">
+                          <a:lumMod val="50000"/>
+                          <a:alpha val="15000"/>
+                        </a:schemeClr>
+                      </a:solidFill>
+                    </a:ln>
+                    <a:solidFill>
+                      <a:schemeClr val="bg2">
+                        <a:lumMod val="50000"/>
+                      </a:schemeClr>
+                    </a:solidFill>
+                    <a:latin typeface="나눔스퀘어" panose="020B0600000101010101" pitchFamily="50" charset="-127"/>
+                    <a:ea typeface="나눔스퀘어" panose="020B0600000101010101" pitchFamily="50" charset="-127"/>
+                    <a:cs typeface="조선일보명조" panose="02030304000000000000" pitchFamily="18" charset="-127"/>
+                  </a:rPr>
+                  <a:t>1.</a:t>
+                </a:r>
+                <a:r>
+                  <a:rPr lang="ko-KR" altLang="en-US" sz="1600" dirty="0">
+                    <a:ln>
+                      <a:solidFill>
+                        <a:schemeClr val="bg2">
+                          <a:lumMod val="50000"/>
+                          <a:alpha val="15000"/>
+                        </a:schemeClr>
+                      </a:solidFill>
+                    </a:ln>
+                    <a:solidFill>
+                      <a:schemeClr val="bg2">
+                        <a:lumMod val="50000"/>
+                      </a:schemeClr>
+                    </a:solidFill>
+                    <a:latin typeface="나눔스퀘어" panose="020B0600000101010101" pitchFamily="50" charset="-127"/>
+                    <a:ea typeface="나눔스퀘어" panose="020B0600000101010101" pitchFamily="50" charset="-127"/>
+                    <a:cs typeface="조선일보명조" panose="02030304000000000000" pitchFamily="18" charset="-127"/>
+                  </a:rPr>
+                  <a:t> </a:t>
+                </a:r>
+                <a:r>
+                  <a:rPr lang="en-US" altLang="ko-KR" sz="1600" dirty="0">
+                    <a:ln>
+                      <a:solidFill>
+                        <a:schemeClr val="bg2">
+                          <a:lumMod val="50000"/>
+                          <a:alpha val="15000"/>
+                        </a:schemeClr>
+                      </a:solidFill>
+                    </a:ln>
+                    <a:solidFill>
+                      <a:schemeClr val="bg2">
+                        <a:lumMod val="50000"/>
+                      </a:schemeClr>
+                    </a:solidFill>
+                    <a:latin typeface="나눔스퀘어" panose="020B0600000101010101" pitchFamily="50" charset="-127"/>
+                    <a:ea typeface="나눔스퀘어" panose="020B0600000101010101" pitchFamily="50" charset="-127"/>
+                    <a:cs typeface="조선일보명조" panose="02030304000000000000" pitchFamily="18" charset="-127"/>
+                  </a:rPr>
+                  <a:t>5</a:t>
+                </a:r>
+                <a:r>
+                  <a:rPr lang="ko-KR" altLang="en-US" sz="1600" dirty="0">
+                    <a:ln>
+                      <a:solidFill>
+                        <a:schemeClr val="bg2">
+                          <a:lumMod val="50000"/>
+                          <a:alpha val="15000"/>
+                        </a:schemeClr>
+                      </a:solidFill>
+                    </a:ln>
+                    <a:solidFill>
+                      <a:schemeClr val="bg2">
+                        <a:lumMod val="50000"/>
+                      </a:schemeClr>
+                    </a:solidFill>
+                    <a:latin typeface="나눔스퀘어" panose="020B0600000101010101" pitchFamily="50" charset="-127"/>
+                    <a:ea typeface="나눔스퀘어" panose="020B0600000101010101" pitchFamily="50" charset="-127"/>
+                    <a:cs typeface="조선일보명조" panose="02030304000000000000" pitchFamily="18" charset="-127"/>
+                  </a:rPr>
+                  <a:t>개 요소에 대해 각각 </a:t>
+                </a:r>
+                <a:r>
+                  <a:rPr lang="en-US" altLang="ko-KR" sz="1600" dirty="0">
+                    <a:ln>
+                      <a:solidFill>
+                        <a:schemeClr val="bg2">
+                          <a:lumMod val="50000"/>
+                          <a:alpha val="15000"/>
+                        </a:schemeClr>
+                      </a:solidFill>
+                    </a:ln>
+                    <a:solidFill>
+                      <a:schemeClr val="bg2">
+                        <a:lumMod val="50000"/>
+                      </a:schemeClr>
+                    </a:solidFill>
+                    <a:latin typeface="나눔스퀘어" panose="020B0600000101010101" pitchFamily="50" charset="-127"/>
+                    <a:ea typeface="나눔스퀘어" panose="020B0600000101010101" pitchFamily="50" charset="-127"/>
+                    <a:cs typeface="조선일보명조" panose="02030304000000000000" pitchFamily="18" charset="-127"/>
+                  </a:rPr>
+                  <a:t>Min-Max Scaling </a:t>
+                </a:r>
+                <a:r>
+                  <a:rPr lang="ko-KR" altLang="en-US" sz="1600" dirty="0">
+                    <a:ln>
+                      <a:solidFill>
+                        <a:schemeClr val="bg2">
+                          <a:lumMod val="50000"/>
+                          <a:alpha val="15000"/>
+                        </a:schemeClr>
+                      </a:solidFill>
+                    </a:ln>
+                    <a:solidFill>
+                      <a:schemeClr val="bg2">
+                        <a:lumMod val="50000"/>
+                      </a:schemeClr>
+                    </a:solidFill>
+                    <a:latin typeface="나눔스퀘어" panose="020B0600000101010101" pitchFamily="50" charset="-127"/>
+                    <a:ea typeface="나눔스퀘어" panose="020B0600000101010101" pitchFamily="50" charset="-127"/>
+                    <a:cs typeface="조선일보명조" panose="02030304000000000000" pitchFamily="18" charset="-127"/>
+                  </a:rPr>
+                  <a:t>적용</a:t>
+                </a:r>
+                <a:endParaRPr lang="en-US" altLang="ko-KR" sz="1600" dirty="0">
+                  <a:ln>
+                    <a:solidFill>
+                      <a:schemeClr val="bg2">
+                        <a:lumMod val="50000"/>
+                        <a:alpha val="15000"/>
+                      </a:schemeClr>
+                    </a:solidFill>
+                  </a:ln>
+                  <a:solidFill>
+                    <a:schemeClr val="bg2">
+                      <a:lumMod val="50000"/>
+                    </a:schemeClr>
+                  </a:solidFill>
+                  <a:latin typeface="나눔스퀘어" panose="020B0600000101010101" pitchFamily="50" charset="-127"/>
+                  <a:ea typeface="나눔스퀘어" panose="020B0600000101010101" pitchFamily="50" charset="-127"/>
+                  <a:cs typeface="조선일보명조" panose="02030304000000000000" pitchFamily="18" charset="-127"/>
+                </a:endParaRPr>
+              </a:p>
+              <a:p>
+                <a:pPr>
+                  <a:lnSpc>
+                    <a:spcPct val="150000"/>
+                  </a:lnSpc>
+                </a:pPr>
+                <a:endParaRPr lang="en-US" altLang="ko-KR" sz="1600" dirty="0">
+                  <a:ln>
+                    <a:solidFill>
+                      <a:schemeClr val="bg2">
+                        <a:lumMod val="50000"/>
+                        <a:alpha val="15000"/>
+                      </a:schemeClr>
+                    </a:solidFill>
+                  </a:ln>
+                  <a:solidFill>
+                    <a:schemeClr val="bg2">
+                      <a:lumMod val="50000"/>
+                    </a:schemeClr>
+                  </a:solidFill>
+                  <a:latin typeface="나눔스퀘어" panose="020B0600000101010101" pitchFamily="50" charset="-127"/>
+                  <a:ea typeface="나눔스퀘어" panose="020B0600000101010101" pitchFamily="50" charset="-127"/>
+                  <a:cs typeface="조선일보명조" panose="02030304000000000000" pitchFamily="18" charset="-127"/>
+                </a:endParaRPr>
+              </a:p>
+              <a:p>
+                <a:pPr>
+                  <a:lnSpc>
+                    <a:spcPct val="150000"/>
+                  </a:lnSpc>
+                </a:pPr>
+                <a:r>
+                  <a:rPr lang="en-US" altLang="ko-KR" sz="1600" dirty="0">
+                    <a:ln>
+                      <a:solidFill>
+                        <a:schemeClr val="bg2">
+                          <a:lumMod val="50000"/>
+                          <a:alpha val="15000"/>
+                        </a:schemeClr>
+                      </a:solidFill>
+                    </a:ln>
+                    <a:solidFill>
+                      <a:schemeClr val="bg2">
+                        <a:lumMod val="50000"/>
+                      </a:schemeClr>
+                    </a:solidFill>
+                    <a:latin typeface="나눔스퀘어" panose="020B0600000101010101" pitchFamily="50" charset="-127"/>
+                    <a:ea typeface="나눔스퀘어" panose="020B0600000101010101" pitchFamily="50" charset="-127"/>
+                    <a:cs typeface="조선일보명조" panose="02030304000000000000" pitchFamily="18" charset="-127"/>
+                  </a:rPr>
+                  <a:t>Step 2. scaling</a:t>
+                </a:r>
+                <a:r>
+                  <a:rPr lang="ko-KR" altLang="en-US" sz="1600" dirty="0">
+                    <a:ln>
+                      <a:solidFill>
+                        <a:schemeClr val="bg2">
+                          <a:lumMod val="50000"/>
+                          <a:alpha val="15000"/>
+                        </a:schemeClr>
+                      </a:solidFill>
+                    </a:ln>
+                    <a:solidFill>
+                      <a:schemeClr val="bg2">
+                        <a:lumMod val="50000"/>
+                      </a:schemeClr>
+                    </a:solidFill>
+                    <a:latin typeface="나눔스퀘어" panose="020B0600000101010101" pitchFamily="50" charset="-127"/>
+                    <a:ea typeface="나눔스퀘어" panose="020B0600000101010101" pitchFamily="50" charset="-127"/>
+                    <a:cs typeface="조선일보명조" panose="02030304000000000000" pitchFamily="18" charset="-127"/>
+                  </a:rPr>
+                  <a:t>한 </a:t>
+                </a:r>
+                <a:r>
+                  <a:rPr lang="en-US" altLang="ko-KR" sz="1600" dirty="0">
+                    <a:ln>
+                      <a:solidFill>
+                        <a:schemeClr val="bg2">
+                          <a:lumMod val="50000"/>
+                          <a:alpha val="15000"/>
+                        </a:schemeClr>
+                      </a:solidFill>
+                    </a:ln>
+                    <a:solidFill>
+                      <a:schemeClr val="bg2">
+                        <a:lumMod val="50000"/>
+                      </a:schemeClr>
+                    </a:solidFill>
+                    <a:latin typeface="나눔스퀘어" panose="020B0600000101010101" pitchFamily="50" charset="-127"/>
+                    <a:ea typeface="나눔스퀘어" panose="020B0600000101010101" pitchFamily="50" charset="-127"/>
+                    <a:cs typeface="조선일보명조" panose="02030304000000000000" pitchFamily="18" charset="-127"/>
+                  </a:rPr>
+                  <a:t>5</a:t>
+                </a:r>
+                <a:r>
+                  <a:rPr lang="ko-KR" altLang="en-US" sz="1600" dirty="0">
+                    <a:ln>
+                      <a:solidFill>
+                        <a:schemeClr val="bg2">
+                          <a:lumMod val="50000"/>
+                          <a:alpha val="15000"/>
+                        </a:schemeClr>
+                      </a:solidFill>
+                    </a:ln>
+                    <a:solidFill>
+                      <a:schemeClr val="bg2">
+                        <a:lumMod val="50000"/>
+                      </a:schemeClr>
+                    </a:solidFill>
+                    <a:latin typeface="나눔스퀘어" panose="020B0600000101010101" pitchFamily="50" charset="-127"/>
+                    <a:ea typeface="나눔스퀘어" panose="020B0600000101010101" pitchFamily="50" charset="-127"/>
+                    <a:cs typeface="조선일보명조" panose="02030304000000000000" pitchFamily="18" charset="-127"/>
+                  </a:rPr>
+                  <a:t>개 요소에 대해 각 지역별 비중 계산</a:t>
+                </a:r>
+                <a:endParaRPr lang="en-US" altLang="ko-KR" sz="1600" dirty="0">
+                  <a:ln>
+                    <a:solidFill>
+                      <a:schemeClr val="bg2">
+                        <a:lumMod val="50000"/>
+                        <a:alpha val="15000"/>
+                      </a:schemeClr>
+                    </a:solidFill>
+                  </a:ln>
+                  <a:solidFill>
+                    <a:schemeClr val="bg2">
+                      <a:lumMod val="50000"/>
+                    </a:schemeClr>
+                  </a:solidFill>
+                  <a:latin typeface="나눔스퀘어" panose="020B0600000101010101" pitchFamily="50" charset="-127"/>
+                  <a:ea typeface="나눔스퀘어" panose="020B0600000101010101" pitchFamily="50" charset="-127"/>
+                  <a:cs typeface="조선일보명조" panose="02030304000000000000" pitchFamily="18" charset="-127"/>
+                </a:endParaRPr>
+              </a:p>
+              <a:p>
+                <a:pPr>
+                  <a:lnSpc>
+                    <a:spcPct val="150000"/>
+                  </a:lnSpc>
+                </a:pPr>
+                <a:r>
+                  <a:rPr lang="en-US" altLang="ko-KR" sz="1600" dirty="0">
+                    <a:ln>
+                      <a:solidFill>
+                        <a:schemeClr val="bg2">
+                          <a:lumMod val="50000"/>
+                          <a:alpha val="15000"/>
+                        </a:schemeClr>
+                      </a:solidFill>
+                    </a:ln>
+                    <a:solidFill>
+                      <a:schemeClr val="bg2">
+                        <a:lumMod val="50000"/>
+                      </a:schemeClr>
+                    </a:solidFill>
+                    <a:latin typeface="나눔스퀘어" panose="020B0600000101010101" pitchFamily="50" charset="-127"/>
+                    <a:ea typeface="나눔스퀘어" panose="020B0600000101010101" pitchFamily="50" charset="-127"/>
+                    <a:cs typeface="조선일보명조" panose="02030304000000000000" pitchFamily="18" charset="-127"/>
+                  </a:rPr>
+                  <a:t>	(</a:t>
+                </a:r>
+                <a14:m>
+                  <m:oMath xmlns:m="http://schemas.openxmlformats.org/officeDocument/2006/math">
+                    <m:sSub>
+                      <m:sSubPr>
+                        <m:ctrlPr>
+                          <a:rPr lang="en-US" altLang="ko-KR" sz="1600" b="0" i="1" smtClean="0">
+                            <a:ln>
+                              <a:solidFill>
+                                <a:schemeClr val="bg2">
+                                  <a:lumMod val="50000"/>
+                                  <a:alpha val="15000"/>
+                                </a:schemeClr>
+                              </a:solidFill>
+                            </a:ln>
+                            <a:solidFill>
+                              <a:schemeClr val="bg2">
+                                <a:lumMod val="50000"/>
+                              </a:schemeClr>
+                            </a:solidFill>
+                            <a:latin typeface="Cambria Math" panose="02040503050406030204" pitchFamily="18" charset="0"/>
+                            <a:ea typeface="나눔스퀘어" panose="020B0600000101010101" pitchFamily="50" charset="-127"/>
+                          </a:rPr>
+                        </m:ctrlPr>
+                      </m:sSubPr>
+                      <m:e>
+                        <m:r>
+                          <a:rPr lang="en-US" altLang="ko-KR" sz="1600" b="0" i="1" smtClean="0">
+                            <a:ln>
+                              <a:solidFill>
+                                <a:schemeClr val="bg2">
+                                  <a:lumMod val="50000"/>
+                                  <a:alpha val="15000"/>
+                                </a:schemeClr>
+                              </a:solidFill>
+                            </a:ln>
+                            <a:solidFill>
+                              <a:schemeClr val="bg2">
+                                <a:lumMod val="50000"/>
+                              </a:schemeClr>
+                            </a:solidFill>
+                            <a:latin typeface="Cambria Math" panose="02040503050406030204" pitchFamily="18" charset="0"/>
+                            <a:ea typeface="나눔스퀘어" panose="020B0600000101010101" pitchFamily="50" charset="-127"/>
+                          </a:rPr>
+                          <m:t>𝑤</m:t>
+                        </m:r>
+                      </m:e>
+                      <m:sub>
+                        <m:r>
+                          <a:rPr lang="en-US" altLang="ko-KR" sz="1600" b="0" i="1" smtClean="0">
+                            <a:ln>
+                              <a:solidFill>
+                                <a:schemeClr val="bg2">
+                                  <a:lumMod val="50000"/>
+                                  <a:alpha val="15000"/>
+                                </a:schemeClr>
+                              </a:solidFill>
+                            </a:ln>
+                            <a:solidFill>
+                              <a:schemeClr val="bg2">
+                                <a:lumMod val="50000"/>
+                              </a:schemeClr>
+                            </a:solidFill>
+                            <a:latin typeface="Cambria Math" panose="02040503050406030204" pitchFamily="18" charset="0"/>
+                            <a:ea typeface="나눔스퀘어" panose="020B0600000101010101" pitchFamily="50" charset="-127"/>
+                          </a:rPr>
+                          <m:t>.</m:t>
+                        </m:r>
+                        <m:r>
+                          <a:rPr lang="en-US" altLang="ko-KR" sz="1600" b="0" i="1" smtClean="0">
+                            <a:ln>
+                              <a:solidFill>
+                                <a:schemeClr val="bg2">
+                                  <a:lumMod val="50000"/>
+                                  <a:alpha val="15000"/>
+                                </a:schemeClr>
+                              </a:solidFill>
+                            </a:ln>
+                            <a:solidFill>
+                              <a:schemeClr val="bg2">
+                                <a:lumMod val="50000"/>
+                              </a:schemeClr>
+                            </a:solidFill>
+                            <a:latin typeface="Cambria Math" panose="02040503050406030204" pitchFamily="18" charset="0"/>
+                            <a:ea typeface="나눔스퀘어" panose="020B0600000101010101" pitchFamily="50" charset="-127"/>
+                          </a:rPr>
+                          <m:t>𝑗</m:t>
+                        </m:r>
+                      </m:sub>
+                    </m:sSub>
+                    <m:r>
+                      <a:rPr lang="en-US" altLang="ko-KR" sz="1600" b="0" i="1" smtClean="0">
+                        <a:ln>
+                          <a:solidFill>
+                            <a:schemeClr val="bg2">
+                              <a:lumMod val="50000"/>
+                              <a:alpha val="15000"/>
+                            </a:schemeClr>
+                          </a:solidFill>
+                        </a:ln>
+                        <a:solidFill>
+                          <a:schemeClr val="bg2">
+                            <a:lumMod val="50000"/>
+                          </a:schemeClr>
+                        </a:solidFill>
+                        <a:latin typeface="Cambria Math" panose="02040503050406030204" pitchFamily="18" charset="0"/>
+                        <a:ea typeface="나눔스퀘어" panose="020B0600000101010101" pitchFamily="50" charset="-127"/>
+                      </a:rPr>
+                      <m:t>=</m:t>
+                    </m:r>
+                    <m:nary>
+                      <m:naryPr>
+                        <m:chr m:val="∑"/>
+                        <m:ctrlPr>
+                          <a:rPr lang="en-US" altLang="ko-KR" sz="1600" i="1" smtClean="0">
+                            <a:ln>
+                              <a:solidFill>
+                                <a:schemeClr val="bg2">
+                                  <a:lumMod val="50000"/>
+                                  <a:alpha val="15000"/>
+                                </a:schemeClr>
+                              </a:solidFill>
+                            </a:ln>
+                            <a:solidFill>
+                              <a:schemeClr val="bg2">
+                                <a:lumMod val="50000"/>
+                              </a:schemeClr>
+                            </a:solidFill>
+                            <a:latin typeface="Cambria Math" panose="02040503050406030204" pitchFamily="18" charset="0"/>
+                            <a:ea typeface="나눔스퀘어" panose="020B0600000101010101" pitchFamily="50" charset="-127"/>
+                          </a:rPr>
+                        </m:ctrlPr>
+                      </m:naryPr>
+                      <m:sub>
+                        <m:r>
+                          <m:rPr>
+                            <m:brk m:alnAt="23"/>
+                          </m:rPr>
+                          <a:rPr lang="en-US" altLang="ko-KR" sz="1600" b="0" i="1" smtClean="0">
+                            <a:ln>
+                              <a:solidFill>
+                                <a:schemeClr val="bg2">
+                                  <a:lumMod val="50000"/>
+                                  <a:alpha val="15000"/>
+                                </a:schemeClr>
+                              </a:solidFill>
+                            </a:ln>
+                            <a:solidFill>
+                              <a:schemeClr val="bg2">
+                                <a:lumMod val="50000"/>
+                              </a:schemeClr>
+                            </a:solidFill>
+                            <a:latin typeface="Cambria Math" panose="02040503050406030204" pitchFamily="18" charset="0"/>
+                            <a:ea typeface="나눔스퀘어" panose="020B0600000101010101" pitchFamily="50" charset="-127"/>
+                          </a:rPr>
+                          <m:t>𝑖</m:t>
+                        </m:r>
+                        <m:r>
+                          <a:rPr lang="en-US" altLang="ko-KR" sz="1600" b="0" i="1" smtClean="0">
+                            <a:ln>
+                              <a:solidFill>
+                                <a:schemeClr val="bg2">
+                                  <a:lumMod val="50000"/>
+                                  <a:alpha val="15000"/>
+                                </a:schemeClr>
+                              </a:solidFill>
+                            </a:ln>
+                            <a:solidFill>
+                              <a:schemeClr val="bg2">
+                                <a:lumMod val="50000"/>
+                              </a:schemeClr>
+                            </a:solidFill>
+                            <a:latin typeface="Cambria Math" panose="02040503050406030204" pitchFamily="18" charset="0"/>
+                            <a:ea typeface="나눔스퀘어" panose="020B0600000101010101" pitchFamily="50" charset="-127"/>
+                          </a:rPr>
+                          <m:t>=1</m:t>
+                        </m:r>
+                      </m:sub>
+                      <m:sup>
+                        <m:r>
+                          <a:rPr lang="en-US" altLang="ko-KR" sz="1600" b="0" i="1" smtClean="0">
+                            <a:ln>
+                              <a:solidFill>
+                                <a:schemeClr val="bg2">
+                                  <a:lumMod val="50000"/>
+                                  <a:alpha val="15000"/>
+                                </a:schemeClr>
+                              </a:solidFill>
+                            </a:ln>
+                            <a:solidFill>
+                              <a:schemeClr val="bg2">
+                                <a:lumMod val="50000"/>
+                              </a:schemeClr>
+                            </a:solidFill>
+                            <a:latin typeface="Cambria Math" panose="02040503050406030204" pitchFamily="18" charset="0"/>
+                            <a:ea typeface="나눔스퀘어" panose="020B0600000101010101" pitchFamily="50" charset="-127"/>
+                          </a:rPr>
+                          <m:t>7</m:t>
+                        </m:r>
+                      </m:sup>
+                      <m:e>
+                        <m:sSub>
+                          <m:sSubPr>
+                            <m:ctrlPr>
+                              <a:rPr lang="en-US" altLang="ko-KR" sz="1600" b="0" i="1" smtClean="0">
+                                <a:ln>
+                                  <a:solidFill>
+                                    <a:schemeClr val="bg2">
+                                      <a:lumMod val="50000"/>
+                                      <a:alpha val="15000"/>
+                                    </a:schemeClr>
+                                  </a:solidFill>
+                                </a:ln>
+                                <a:solidFill>
+                                  <a:schemeClr val="bg2">
+                                    <a:lumMod val="50000"/>
+                                  </a:schemeClr>
+                                </a:solidFill>
+                                <a:latin typeface="Cambria Math" panose="02040503050406030204" pitchFamily="18" charset="0"/>
+                                <a:ea typeface="나눔스퀘어" panose="020B0600000101010101" pitchFamily="50" charset="-127"/>
+                              </a:rPr>
+                            </m:ctrlPr>
+                          </m:sSubPr>
+                          <m:e>
+                            <m:r>
+                              <a:rPr lang="en-US" altLang="ko-KR" sz="1600" b="0" i="1" smtClean="0">
+                                <a:ln>
+                                  <a:solidFill>
+                                    <a:schemeClr val="bg2">
+                                      <a:lumMod val="50000"/>
+                                      <a:alpha val="15000"/>
+                                    </a:schemeClr>
+                                  </a:solidFill>
+                                </a:ln>
+                                <a:solidFill>
+                                  <a:schemeClr val="bg2">
+                                    <a:lumMod val="50000"/>
+                                  </a:schemeClr>
+                                </a:solidFill>
+                                <a:latin typeface="Cambria Math" panose="02040503050406030204" pitchFamily="18" charset="0"/>
+                                <a:ea typeface="나눔스퀘어" panose="020B0600000101010101" pitchFamily="50" charset="-127"/>
+                              </a:rPr>
+                              <m:t>𝑤</m:t>
+                            </m:r>
+                          </m:e>
+                          <m:sub>
+                            <m:r>
+                              <a:rPr lang="en-US" altLang="ko-KR" sz="1600" b="0" i="1" smtClean="0">
+                                <a:ln>
+                                  <a:solidFill>
+                                    <a:schemeClr val="bg2">
+                                      <a:lumMod val="50000"/>
+                                      <a:alpha val="15000"/>
+                                    </a:schemeClr>
+                                  </a:solidFill>
+                                </a:ln>
+                                <a:solidFill>
+                                  <a:schemeClr val="bg2">
+                                    <a:lumMod val="50000"/>
+                                  </a:schemeClr>
+                                </a:solidFill>
+                                <a:latin typeface="Cambria Math" panose="02040503050406030204" pitchFamily="18" charset="0"/>
+                                <a:ea typeface="나눔스퀘어" panose="020B0600000101010101" pitchFamily="50" charset="-127"/>
+                              </a:rPr>
+                              <m:t>𝑖𝑗</m:t>
+                            </m:r>
+                          </m:sub>
+                        </m:sSub>
+                      </m:e>
+                    </m:nary>
+                  </m:oMath>
+                </a14:m>
+                <a:r>
+                  <a:rPr lang="en-US" altLang="ko-KR" sz="1600" dirty="0">
+                    <a:ln>
+                      <a:solidFill>
+                        <a:schemeClr val="bg2">
+                          <a:lumMod val="50000"/>
+                          <a:alpha val="15000"/>
+                        </a:schemeClr>
+                      </a:solidFill>
+                    </a:ln>
+                    <a:solidFill>
+                      <a:schemeClr val="bg2">
+                        <a:lumMod val="50000"/>
+                      </a:schemeClr>
+                    </a:solidFill>
+                    <a:latin typeface="나눔스퀘어" panose="020B0600000101010101" pitchFamily="50" charset="-127"/>
+                    <a:ea typeface="나눔스퀘어" panose="020B0600000101010101" pitchFamily="50" charset="-127"/>
+                    <a:cs typeface="조선일보명조" panose="02030304000000000000" pitchFamily="18" charset="-127"/>
+                  </a:rPr>
+                  <a:t>=1, j: 5</a:t>
+                </a:r>
+                <a:r>
+                  <a:rPr lang="ko-KR" altLang="en-US" sz="1600" dirty="0">
+                    <a:ln>
+                      <a:solidFill>
+                        <a:schemeClr val="bg2">
+                          <a:lumMod val="50000"/>
+                          <a:alpha val="15000"/>
+                        </a:schemeClr>
+                      </a:solidFill>
+                    </a:ln>
+                    <a:solidFill>
+                      <a:schemeClr val="bg2">
+                        <a:lumMod val="50000"/>
+                      </a:schemeClr>
+                    </a:solidFill>
+                    <a:latin typeface="나눔스퀘어" panose="020B0600000101010101" pitchFamily="50" charset="-127"/>
+                    <a:ea typeface="나눔스퀘어" panose="020B0600000101010101" pitchFamily="50" charset="-127"/>
+                    <a:cs typeface="조선일보명조" panose="02030304000000000000" pitchFamily="18" charset="-127"/>
+                  </a:rPr>
+                  <a:t>가지 요소</a:t>
+                </a:r>
+                <a:r>
+                  <a:rPr lang="en-US" altLang="ko-KR" sz="1600" dirty="0">
+                    <a:ln>
+                      <a:solidFill>
+                        <a:schemeClr val="bg2">
+                          <a:lumMod val="50000"/>
+                          <a:alpha val="15000"/>
+                        </a:schemeClr>
+                      </a:solidFill>
+                    </a:ln>
+                    <a:solidFill>
+                      <a:schemeClr val="bg2">
+                        <a:lumMod val="50000"/>
+                      </a:schemeClr>
+                    </a:solidFill>
+                    <a:latin typeface="나눔스퀘어" panose="020B0600000101010101" pitchFamily="50" charset="-127"/>
+                    <a:ea typeface="나눔스퀘어" panose="020B0600000101010101" pitchFamily="50" charset="-127"/>
+                    <a:cs typeface="조선일보명조" panose="02030304000000000000" pitchFamily="18" charset="-127"/>
+                  </a:rPr>
+                  <a:t>)</a:t>
+                </a:r>
+              </a:p>
+              <a:p>
+                <a:pPr>
+                  <a:lnSpc>
+                    <a:spcPct val="150000"/>
+                  </a:lnSpc>
+                </a:pPr>
+                <a:endParaRPr lang="en-US" altLang="ko-KR" sz="1600" dirty="0">
+                  <a:ln>
+                    <a:solidFill>
+                      <a:schemeClr val="bg2">
+                        <a:lumMod val="50000"/>
+                        <a:alpha val="15000"/>
+                      </a:schemeClr>
+                    </a:solidFill>
+                  </a:ln>
+                  <a:solidFill>
+                    <a:schemeClr val="bg2">
+                      <a:lumMod val="50000"/>
+                    </a:schemeClr>
+                  </a:solidFill>
+                  <a:latin typeface="나눔스퀘어" panose="020B0600000101010101" pitchFamily="50" charset="-127"/>
+                  <a:ea typeface="나눔스퀘어" panose="020B0600000101010101" pitchFamily="50" charset="-127"/>
+                  <a:cs typeface="조선일보명조" panose="02030304000000000000" pitchFamily="18" charset="-127"/>
+                </a:endParaRPr>
+              </a:p>
+              <a:p>
+                <a:pPr>
+                  <a:lnSpc>
+                    <a:spcPct val="150000"/>
+                  </a:lnSpc>
+                </a:pPr>
+                <a:r>
+                  <a:rPr lang="en-US" altLang="ko-KR" sz="1600" dirty="0">
+                    <a:ln>
+                      <a:solidFill>
+                        <a:schemeClr val="bg2">
+                          <a:lumMod val="50000"/>
+                          <a:alpha val="15000"/>
+                        </a:schemeClr>
+                      </a:solidFill>
+                    </a:ln>
+                    <a:solidFill>
+                      <a:schemeClr val="bg2">
+                        <a:lumMod val="50000"/>
+                      </a:schemeClr>
+                    </a:solidFill>
+                    <a:latin typeface="나눔스퀘어" panose="020B0600000101010101" pitchFamily="50" charset="-127"/>
+                    <a:ea typeface="나눔스퀘어" panose="020B0600000101010101" pitchFamily="50" charset="-127"/>
+                    <a:cs typeface="조선일보명조" panose="02030304000000000000" pitchFamily="18" charset="-127"/>
+                  </a:rPr>
+                  <a:t>Step 3. </a:t>
+                </a:r>
+                <a:r>
+                  <a:rPr lang="ko-KR" altLang="en-US" sz="1600" dirty="0">
+                    <a:ln>
+                      <a:solidFill>
+                        <a:schemeClr val="bg2">
+                          <a:lumMod val="50000"/>
+                          <a:alpha val="15000"/>
+                        </a:schemeClr>
+                      </a:solidFill>
+                    </a:ln>
+                    <a:solidFill>
+                      <a:schemeClr val="bg2">
+                        <a:lumMod val="50000"/>
+                      </a:schemeClr>
+                    </a:solidFill>
+                    <a:latin typeface="나눔스퀘어" panose="020B0600000101010101" pitchFamily="50" charset="-127"/>
+                    <a:ea typeface="나눔스퀘어" panose="020B0600000101010101" pitchFamily="50" charset="-127"/>
+                    <a:cs typeface="조선일보명조" panose="02030304000000000000" pitchFamily="18" charset="-127"/>
+                  </a:rPr>
+                  <a:t>각 지역별로 </a:t>
+                </a:r>
+                <a:r>
+                  <a:rPr lang="en-US" altLang="ko-KR" sz="1600" dirty="0">
+                    <a:ln>
+                      <a:solidFill>
+                        <a:schemeClr val="bg2">
+                          <a:lumMod val="50000"/>
+                          <a:alpha val="15000"/>
+                        </a:schemeClr>
+                      </a:solidFill>
+                    </a:ln>
+                    <a:solidFill>
+                      <a:schemeClr val="bg2">
+                        <a:lumMod val="50000"/>
+                      </a:schemeClr>
+                    </a:solidFill>
+                    <a:latin typeface="나눔스퀘어" panose="020B0600000101010101" pitchFamily="50" charset="-127"/>
+                    <a:ea typeface="나눔스퀘어" panose="020B0600000101010101" pitchFamily="50" charset="-127"/>
+                    <a:cs typeface="조선일보명조" panose="02030304000000000000" pitchFamily="18" charset="-127"/>
+                  </a:rPr>
+                  <a:t>5</a:t>
+                </a:r>
+                <a:r>
+                  <a:rPr lang="ko-KR" altLang="en-US" sz="1600" dirty="0">
+                    <a:ln>
+                      <a:solidFill>
+                        <a:schemeClr val="bg2">
+                          <a:lumMod val="50000"/>
+                          <a:alpha val="15000"/>
+                        </a:schemeClr>
+                      </a:solidFill>
+                    </a:ln>
+                    <a:solidFill>
+                      <a:schemeClr val="bg2">
+                        <a:lumMod val="50000"/>
+                      </a:schemeClr>
+                    </a:solidFill>
+                    <a:latin typeface="나눔스퀘어" panose="020B0600000101010101" pitchFamily="50" charset="-127"/>
+                    <a:ea typeface="나눔스퀘어" panose="020B0600000101010101" pitchFamily="50" charset="-127"/>
+                    <a:cs typeface="조선일보명조" panose="02030304000000000000" pitchFamily="18" charset="-127"/>
+                  </a:rPr>
+                  <a:t>개 요소에 대해 계산</a:t>
+                </a:r>
+                <a:endParaRPr lang="en-US" altLang="ko-KR" sz="1600" dirty="0">
+                  <a:ln>
+                    <a:solidFill>
+                      <a:schemeClr val="bg2">
+                        <a:lumMod val="50000"/>
+                        <a:alpha val="15000"/>
+                      </a:schemeClr>
+                    </a:solidFill>
+                  </a:ln>
+                  <a:solidFill>
+                    <a:schemeClr val="bg2">
+                      <a:lumMod val="50000"/>
+                    </a:schemeClr>
+                  </a:solidFill>
+                  <a:latin typeface="나눔스퀘어" panose="020B0600000101010101" pitchFamily="50" charset="-127"/>
+                  <a:ea typeface="나눔스퀘어" panose="020B0600000101010101" pitchFamily="50" charset="-127"/>
+                  <a:cs typeface="조선일보명조" panose="02030304000000000000" pitchFamily="18" charset="-127"/>
+                </a:endParaRPr>
+              </a:p>
+              <a:p>
+                <a:pPr>
+                  <a:lnSpc>
+                    <a:spcPct val="150000"/>
+                  </a:lnSpc>
+                </a:pPr>
+                <a:r>
+                  <a:rPr lang="en-US" altLang="ko-KR" sz="1600" dirty="0">
+                    <a:ln>
+                      <a:solidFill>
+                        <a:schemeClr val="bg2">
+                          <a:lumMod val="50000"/>
+                          <a:alpha val="15000"/>
+                        </a:schemeClr>
+                      </a:solidFill>
+                    </a:ln>
+                    <a:solidFill>
+                      <a:schemeClr val="bg2">
+                        <a:lumMod val="50000"/>
+                      </a:schemeClr>
+                    </a:solidFill>
+                    <a:latin typeface="나눔스퀘어" panose="020B0600000101010101" pitchFamily="50" charset="-127"/>
+                    <a:ea typeface="나눔스퀘어" panose="020B0600000101010101" pitchFamily="50" charset="-127"/>
+                    <a:cs typeface="조선일보명조" panose="02030304000000000000" pitchFamily="18" charset="-127"/>
+                  </a:rPr>
+                  <a:t>	(</a:t>
+                </a:r>
+                <a14:m>
+                  <m:oMath xmlns:m="http://schemas.openxmlformats.org/officeDocument/2006/math">
+                    <m:sSub>
+                      <m:sSubPr>
+                        <m:ctrlPr>
+                          <a:rPr lang="en-US" altLang="ko-KR" sz="1600" i="1" smtClean="0">
+                            <a:ln>
+                              <a:solidFill>
+                                <a:schemeClr val="bg2">
+                                  <a:lumMod val="50000"/>
+                                  <a:alpha val="15000"/>
+                                </a:schemeClr>
+                              </a:solidFill>
+                            </a:ln>
+                            <a:solidFill>
+                              <a:schemeClr val="bg2">
+                                <a:lumMod val="50000"/>
+                              </a:schemeClr>
+                            </a:solidFill>
+                            <a:latin typeface="Cambria Math" panose="02040503050406030204" pitchFamily="18" charset="0"/>
+                            <a:ea typeface="나눔스퀘어" panose="020B0600000101010101" pitchFamily="50" charset="-127"/>
+                          </a:rPr>
+                        </m:ctrlPr>
+                      </m:sSubPr>
+                      <m:e>
+                        <m:r>
+                          <a:rPr lang="en-US" altLang="ko-KR" sz="1600" b="0" i="1" smtClean="0">
+                            <a:ln>
+                              <a:solidFill>
+                                <a:schemeClr val="bg2">
+                                  <a:lumMod val="50000"/>
+                                  <a:alpha val="15000"/>
+                                </a:schemeClr>
+                              </a:solidFill>
+                            </a:ln>
+                            <a:solidFill>
+                              <a:schemeClr val="bg2">
+                                <a:lumMod val="50000"/>
+                              </a:schemeClr>
+                            </a:solidFill>
+                            <a:latin typeface="Cambria Math" panose="02040503050406030204" pitchFamily="18" charset="0"/>
+                            <a:ea typeface="나눔스퀘어" panose="020B0600000101010101" pitchFamily="50" charset="-127"/>
+                          </a:rPr>
+                          <m:t>𝑤</m:t>
+                        </m:r>
+                      </m:e>
+                      <m:sub>
+                        <m:r>
+                          <a:rPr lang="en-US" altLang="ko-KR" sz="1600" b="0" i="1" smtClean="0">
+                            <a:ln>
+                              <a:solidFill>
+                                <a:schemeClr val="bg2">
+                                  <a:lumMod val="50000"/>
+                                  <a:alpha val="15000"/>
+                                </a:schemeClr>
+                              </a:solidFill>
+                            </a:ln>
+                            <a:solidFill>
+                              <a:schemeClr val="bg2">
+                                <a:lumMod val="50000"/>
+                              </a:schemeClr>
+                            </a:solidFill>
+                            <a:latin typeface="Cambria Math" panose="02040503050406030204" pitchFamily="18" charset="0"/>
+                            <a:ea typeface="나눔스퀘어" panose="020B0600000101010101" pitchFamily="50" charset="-127"/>
+                          </a:rPr>
+                          <m:t>𝑖</m:t>
+                        </m:r>
+                        <m:r>
+                          <a:rPr lang="en-US" altLang="ko-KR" sz="1600" b="0" i="1" smtClean="0">
+                            <a:ln>
+                              <a:solidFill>
+                                <a:schemeClr val="bg2">
+                                  <a:lumMod val="50000"/>
+                                  <a:alpha val="15000"/>
+                                </a:schemeClr>
+                              </a:solidFill>
+                            </a:ln>
+                            <a:solidFill>
+                              <a:schemeClr val="bg2">
+                                <a:lumMod val="50000"/>
+                              </a:schemeClr>
+                            </a:solidFill>
+                            <a:latin typeface="Cambria Math" panose="02040503050406030204" pitchFamily="18" charset="0"/>
+                            <a:ea typeface="나눔스퀘어" panose="020B0600000101010101" pitchFamily="50" charset="-127"/>
+                          </a:rPr>
+                          <m:t>.</m:t>
+                        </m:r>
+                      </m:sub>
+                    </m:sSub>
+                  </m:oMath>
+                </a14:m>
+                <a:r>
+                  <a:rPr lang="en-US" altLang="ko-KR" sz="1600" dirty="0">
+                    <a:ln>
+                      <a:solidFill>
+                        <a:schemeClr val="bg2">
+                          <a:lumMod val="50000"/>
+                          <a:alpha val="15000"/>
+                        </a:schemeClr>
+                      </a:solidFill>
+                    </a:ln>
+                    <a:solidFill>
+                      <a:schemeClr val="bg2">
+                        <a:lumMod val="50000"/>
+                      </a:schemeClr>
+                    </a:solidFill>
+                    <a:latin typeface="나눔스퀘어" panose="020B0600000101010101" pitchFamily="50" charset="-127"/>
+                    <a:ea typeface="나눔스퀘어" panose="020B0600000101010101" pitchFamily="50" charset="-127"/>
+                    <a:cs typeface="조선일보명조" panose="02030304000000000000" pitchFamily="18" charset="-127"/>
+                  </a:rPr>
+                  <a:t>=</a:t>
+                </a:r>
+                <a14:m>
+                  <m:oMath xmlns:m="http://schemas.openxmlformats.org/officeDocument/2006/math">
+                    <m:sSub>
+                      <m:sSubPr>
+                        <m:ctrlPr>
+                          <a:rPr lang="en-US" altLang="ko-KR" sz="1600" i="1" dirty="0" smtClean="0">
+                            <a:ln>
+                              <a:solidFill>
+                                <a:schemeClr val="bg2">
+                                  <a:lumMod val="50000"/>
+                                  <a:alpha val="15000"/>
+                                </a:schemeClr>
+                              </a:solidFill>
+                            </a:ln>
+                            <a:solidFill>
+                              <a:schemeClr val="bg2">
+                                <a:lumMod val="50000"/>
+                              </a:schemeClr>
+                            </a:solidFill>
+                            <a:latin typeface="Cambria Math" panose="02040503050406030204" pitchFamily="18" charset="0"/>
+                            <a:ea typeface="나눔스퀘어" panose="020B0600000101010101" pitchFamily="50" charset="-127"/>
+                          </a:rPr>
+                        </m:ctrlPr>
+                      </m:sSubPr>
+                      <m:e>
+                        <m:r>
+                          <a:rPr lang="en-US" altLang="ko-KR" sz="1600" b="0" i="1" dirty="0" smtClean="0">
+                            <a:ln>
+                              <a:solidFill>
+                                <a:schemeClr val="bg2">
+                                  <a:lumMod val="50000"/>
+                                  <a:alpha val="15000"/>
+                                </a:schemeClr>
+                              </a:solidFill>
+                            </a:ln>
+                            <a:solidFill>
+                              <a:schemeClr val="bg2">
+                                <a:lumMod val="50000"/>
+                              </a:schemeClr>
+                            </a:solidFill>
+                            <a:latin typeface="Cambria Math" panose="02040503050406030204" pitchFamily="18" charset="0"/>
+                            <a:ea typeface="나눔스퀘어" panose="020B0600000101010101" pitchFamily="50" charset="-127"/>
+                          </a:rPr>
+                          <m:t>𝑤</m:t>
+                        </m:r>
+                      </m:e>
+                      <m:sub>
+                        <m:r>
+                          <a:rPr lang="en-US" altLang="ko-KR" sz="1600" b="0" i="1" dirty="0" smtClean="0">
+                            <a:ln>
+                              <a:solidFill>
+                                <a:schemeClr val="bg2">
+                                  <a:lumMod val="50000"/>
+                                  <a:alpha val="15000"/>
+                                </a:schemeClr>
+                              </a:solidFill>
+                            </a:ln>
+                            <a:solidFill>
+                              <a:schemeClr val="bg2">
+                                <a:lumMod val="50000"/>
+                              </a:schemeClr>
+                            </a:solidFill>
+                            <a:latin typeface="Cambria Math" panose="02040503050406030204" pitchFamily="18" charset="0"/>
+                            <a:ea typeface="나눔스퀘어" panose="020B0600000101010101" pitchFamily="50" charset="-127"/>
+                          </a:rPr>
+                          <m:t>𝑖</m:t>
+                        </m:r>
+                        <m:r>
+                          <a:rPr lang="en-US" altLang="ko-KR" sz="1600" b="0" i="1" dirty="0" smtClean="0">
+                            <a:ln>
+                              <a:solidFill>
+                                <a:schemeClr val="bg2">
+                                  <a:lumMod val="50000"/>
+                                  <a:alpha val="15000"/>
+                                </a:schemeClr>
+                              </a:solidFill>
+                            </a:ln>
+                            <a:solidFill>
+                              <a:schemeClr val="bg2">
+                                <a:lumMod val="50000"/>
+                              </a:schemeClr>
+                            </a:solidFill>
+                            <a:latin typeface="Cambria Math" panose="02040503050406030204" pitchFamily="18" charset="0"/>
+                            <a:ea typeface="나눔스퀘어" panose="020B0600000101010101" pitchFamily="50" charset="-127"/>
+                          </a:rPr>
+                          <m:t>1</m:t>
+                        </m:r>
+                      </m:sub>
+                    </m:sSub>
+                    <m:r>
+                      <a:rPr lang="en-US" altLang="ko-KR" sz="1600" b="0" i="1" dirty="0" smtClean="0">
+                        <a:ln>
+                          <a:solidFill>
+                            <a:schemeClr val="bg2">
+                              <a:lumMod val="50000"/>
+                              <a:alpha val="15000"/>
+                            </a:schemeClr>
+                          </a:solidFill>
+                        </a:ln>
+                        <a:solidFill>
+                          <a:schemeClr val="bg2">
+                            <a:lumMod val="50000"/>
+                          </a:schemeClr>
+                        </a:solidFill>
+                        <a:latin typeface="Cambria Math" panose="02040503050406030204" pitchFamily="18" charset="0"/>
+                        <a:ea typeface="나눔스퀘어" panose="020B0600000101010101" pitchFamily="50" charset="-127"/>
+                      </a:rPr>
+                      <m:t>+</m:t>
+                    </m:r>
+                    <m:sSub>
+                      <m:sSubPr>
+                        <m:ctrlPr>
+                          <a:rPr lang="en-US" altLang="ko-KR" sz="1600" i="1" dirty="0" smtClean="0">
+                            <a:ln>
+                              <a:solidFill>
+                                <a:schemeClr val="bg2">
+                                  <a:lumMod val="50000"/>
+                                  <a:alpha val="15000"/>
+                                </a:schemeClr>
+                              </a:solidFill>
+                            </a:ln>
+                            <a:solidFill>
+                              <a:schemeClr val="bg2">
+                                <a:lumMod val="50000"/>
+                              </a:schemeClr>
+                            </a:solidFill>
+                            <a:latin typeface="Cambria Math" panose="02040503050406030204" pitchFamily="18" charset="0"/>
+                            <a:ea typeface="나눔스퀘어" panose="020B0600000101010101" pitchFamily="50" charset="-127"/>
+                          </a:rPr>
+                        </m:ctrlPr>
+                      </m:sSubPr>
+                      <m:e>
+                        <m:r>
+                          <a:rPr lang="en-US" altLang="ko-KR" sz="1600" b="0" i="1" dirty="0" smtClean="0">
+                            <a:ln>
+                              <a:solidFill>
+                                <a:schemeClr val="bg2">
+                                  <a:lumMod val="50000"/>
+                                  <a:alpha val="15000"/>
+                                </a:schemeClr>
+                              </a:solidFill>
+                            </a:ln>
+                            <a:solidFill>
+                              <a:schemeClr val="bg2">
+                                <a:lumMod val="50000"/>
+                              </a:schemeClr>
+                            </a:solidFill>
+                            <a:latin typeface="Cambria Math" panose="02040503050406030204" pitchFamily="18" charset="0"/>
+                            <a:ea typeface="나눔스퀘어" panose="020B0600000101010101" pitchFamily="50" charset="-127"/>
+                          </a:rPr>
+                          <m:t>𝑤</m:t>
+                        </m:r>
+                      </m:e>
+                      <m:sub>
+                        <m:r>
+                          <a:rPr lang="en-US" altLang="ko-KR" sz="1600" b="0" i="1" dirty="0" smtClean="0">
+                            <a:ln>
+                              <a:solidFill>
+                                <a:schemeClr val="bg2">
+                                  <a:lumMod val="50000"/>
+                                  <a:alpha val="15000"/>
+                                </a:schemeClr>
+                              </a:solidFill>
+                            </a:ln>
+                            <a:solidFill>
+                              <a:schemeClr val="bg2">
+                                <a:lumMod val="50000"/>
+                              </a:schemeClr>
+                            </a:solidFill>
+                            <a:latin typeface="Cambria Math" panose="02040503050406030204" pitchFamily="18" charset="0"/>
+                            <a:ea typeface="나눔스퀘어" panose="020B0600000101010101" pitchFamily="50" charset="-127"/>
+                          </a:rPr>
+                          <m:t>𝑖</m:t>
+                        </m:r>
+                        <m:r>
+                          <a:rPr lang="en-US" altLang="ko-KR" sz="1600" b="0" i="1" dirty="0" smtClean="0">
+                            <a:ln>
+                              <a:solidFill>
+                                <a:schemeClr val="bg2">
+                                  <a:lumMod val="50000"/>
+                                  <a:alpha val="15000"/>
+                                </a:schemeClr>
+                              </a:solidFill>
+                            </a:ln>
+                            <a:solidFill>
+                              <a:schemeClr val="bg2">
+                                <a:lumMod val="50000"/>
+                              </a:schemeClr>
+                            </a:solidFill>
+                            <a:latin typeface="Cambria Math" panose="02040503050406030204" pitchFamily="18" charset="0"/>
+                            <a:ea typeface="나눔스퀘어" panose="020B0600000101010101" pitchFamily="50" charset="-127"/>
+                          </a:rPr>
+                          <m:t>2</m:t>
+                        </m:r>
+                      </m:sub>
+                    </m:sSub>
+                    <m:r>
+                      <a:rPr lang="en-US" altLang="ko-KR" sz="1600" b="0" i="1" dirty="0" smtClean="0">
+                        <a:ln>
+                          <a:solidFill>
+                            <a:schemeClr val="bg2">
+                              <a:lumMod val="50000"/>
+                              <a:alpha val="15000"/>
+                            </a:schemeClr>
+                          </a:solidFill>
+                        </a:ln>
+                        <a:solidFill>
+                          <a:schemeClr val="bg2">
+                            <a:lumMod val="50000"/>
+                          </a:schemeClr>
+                        </a:solidFill>
+                        <a:latin typeface="Cambria Math" panose="02040503050406030204" pitchFamily="18" charset="0"/>
+                        <a:ea typeface="나눔스퀘어" panose="020B0600000101010101" pitchFamily="50" charset="-127"/>
+                      </a:rPr>
+                      <m:t>+</m:t>
+                    </m:r>
+                    <m:sSub>
+                      <m:sSubPr>
+                        <m:ctrlPr>
+                          <a:rPr lang="en-US" altLang="ko-KR" sz="1600" i="1" dirty="0" smtClean="0">
+                            <a:ln>
+                              <a:solidFill>
+                                <a:schemeClr val="bg2">
+                                  <a:lumMod val="50000"/>
+                                  <a:alpha val="15000"/>
+                                </a:schemeClr>
+                              </a:solidFill>
+                            </a:ln>
+                            <a:solidFill>
+                              <a:schemeClr val="bg2">
+                                <a:lumMod val="50000"/>
+                              </a:schemeClr>
+                            </a:solidFill>
+                            <a:latin typeface="Cambria Math" panose="02040503050406030204" pitchFamily="18" charset="0"/>
+                            <a:ea typeface="나눔스퀘어" panose="020B0600000101010101" pitchFamily="50" charset="-127"/>
+                          </a:rPr>
+                        </m:ctrlPr>
+                      </m:sSubPr>
+                      <m:e>
+                        <m:r>
+                          <a:rPr lang="en-US" altLang="ko-KR" sz="1600" b="0" i="1" dirty="0" smtClean="0">
+                            <a:ln>
+                              <a:solidFill>
+                                <a:schemeClr val="bg2">
+                                  <a:lumMod val="50000"/>
+                                  <a:alpha val="15000"/>
+                                </a:schemeClr>
+                              </a:solidFill>
+                            </a:ln>
+                            <a:solidFill>
+                              <a:schemeClr val="bg2">
+                                <a:lumMod val="50000"/>
+                              </a:schemeClr>
+                            </a:solidFill>
+                            <a:latin typeface="Cambria Math" panose="02040503050406030204" pitchFamily="18" charset="0"/>
+                            <a:ea typeface="나눔스퀘어" panose="020B0600000101010101" pitchFamily="50" charset="-127"/>
+                          </a:rPr>
+                          <m:t>𝑤</m:t>
+                        </m:r>
+                      </m:e>
+                      <m:sub>
+                        <m:r>
+                          <a:rPr lang="en-US" altLang="ko-KR" sz="1600" b="0" i="1" dirty="0" smtClean="0">
+                            <a:ln>
+                              <a:solidFill>
+                                <a:schemeClr val="bg2">
+                                  <a:lumMod val="50000"/>
+                                  <a:alpha val="15000"/>
+                                </a:schemeClr>
+                              </a:solidFill>
+                            </a:ln>
+                            <a:solidFill>
+                              <a:schemeClr val="bg2">
+                                <a:lumMod val="50000"/>
+                              </a:schemeClr>
+                            </a:solidFill>
+                            <a:latin typeface="Cambria Math" panose="02040503050406030204" pitchFamily="18" charset="0"/>
+                            <a:ea typeface="나눔스퀘어" panose="020B0600000101010101" pitchFamily="50" charset="-127"/>
+                          </a:rPr>
+                          <m:t>𝑖</m:t>
+                        </m:r>
+                        <m:r>
+                          <a:rPr lang="en-US" altLang="ko-KR" sz="1600" b="0" i="1" dirty="0" smtClean="0">
+                            <a:ln>
+                              <a:solidFill>
+                                <a:schemeClr val="bg2">
+                                  <a:lumMod val="50000"/>
+                                  <a:alpha val="15000"/>
+                                </a:schemeClr>
+                              </a:solidFill>
+                            </a:ln>
+                            <a:solidFill>
+                              <a:schemeClr val="bg2">
+                                <a:lumMod val="50000"/>
+                              </a:schemeClr>
+                            </a:solidFill>
+                            <a:latin typeface="Cambria Math" panose="02040503050406030204" pitchFamily="18" charset="0"/>
+                            <a:ea typeface="나눔스퀘어" panose="020B0600000101010101" pitchFamily="50" charset="-127"/>
+                          </a:rPr>
+                          <m:t>3</m:t>
+                        </m:r>
+                      </m:sub>
+                    </m:sSub>
+                    <m:r>
+                      <a:rPr lang="en-US" altLang="ko-KR" sz="1600" b="0" i="1" dirty="0" smtClean="0">
+                        <a:ln>
+                          <a:solidFill>
+                            <a:schemeClr val="bg2">
+                              <a:lumMod val="50000"/>
+                              <a:alpha val="15000"/>
+                            </a:schemeClr>
+                          </a:solidFill>
+                        </a:ln>
+                        <a:solidFill>
+                          <a:schemeClr val="bg2">
+                            <a:lumMod val="50000"/>
+                          </a:schemeClr>
+                        </a:solidFill>
+                        <a:latin typeface="Cambria Math" panose="02040503050406030204" pitchFamily="18" charset="0"/>
+                        <a:ea typeface="나눔스퀘어" panose="020B0600000101010101" pitchFamily="50" charset="-127"/>
+                      </a:rPr>
+                      <m:t>−</m:t>
+                    </m:r>
+                    <m:sSub>
+                      <m:sSubPr>
+                        <m:ctrlPr>
+                          <a:rPr lang="en-US" altLang="ko-KR" sz="1600" i="1" dirty="0" smtClean="0">
+                            <a:ln>
+                              <a:solidFill>
+                                <a:schemeClr val="bg2">
+                                  <a:lumMod val="50000"/>
+                                  <a:alpha val="15000"/>
+                                </a:schemeClr>
+                              </a:solidFill>
+                            </a:ln>
+                            <a:solidFill>
+                              <a:schemeClr val="bg2">
+                                <a:lumMod val="50000"/>
+                              </a:schemeClr>
+                            </a:solidFill>
+                            <a:latin typeface="Cambria Math" panose="02040503050406030204" pitchFamily="18" charset="0"/>
+                            <a:ea typeface="나눔스퀘어" panose="020B0600000101010101" pitchFamily="50" charset="-127"/>
+                          </a:rPr>
+                        </m:ctrlPr>
+                      </m:sSubPr>
+                      <m:e>
+                        <m:r>
+                          <a:rPr lang="en-US" altLang="ko-KR" sz="1600" b="0" i="1" dirty="0" smtClean="0">
+                            <a:ln>
+                              <a:solidFill>
+                                <a:schemeClr val="bg2">
+                                  <a:lumMod val="50000"/>
+                                  <a:alpha val="15000"/>
+                                </a:schemeClr>
+                              </a:solidFill>
+                            </a:ln>
+                            <a:solidFill>
+                              <a:schemeClr val="bg2">
+                                <a:lumMod val="50000"/>
+                              </a:schemeClr>
+                            </a:solidFill>
+                            <a:latin typeface="Cambria Math" panose="02040503050406030204" pitchFamily="18" charset="0"/>
+                            <a:ea typeface="나눔스퀘어" panose="020B0600000101010101" pitchFamily="50" charset="-127"/>
+                          </a:rPr>
+                          <m:t>𝑤</m:t>
+                        </m:r>
+                      </m:e>
+                      <m:sub>
+                        <m:r>
+                          <a:rPr lang="en-US" altLang="ko-KR" sz="1600" b="0" i="1" dirty="0" smtClean="0">
+                            <a:ln>
+                              <a:solidFill>
+                                <a:schemeClr val="bg2">
+                                  <a:lumMod val="50000"/>
+                                  <a:alpha val="15000"/>
+                                </a:schemeClr>
+                              </a:solidFill>
+                            </a:ln>
+                            <a:solidFill>
+                              <a:schemeClr val="bg2">
+                                <a:lumMod val="50000"/>
+                              </a:schemeClr>
+                            </a:solidFill>
+                            <a:latin typeface="Cambria Math" panose="02040503050406030204" pitchFamily="18" charset="0"/>
+                            <a:ea typeface="나눔스퀘어" panose="020B0600000101010101" pitchFamily="50" charset="-127"/>
+                          </a:rPr>
+                          <m:t>𝑖</m:t>
+                        </m:r>
+                        <m:r>
+                          <a:rPr lang="en-US" altLang="ko-KR" sz="1600" b="0" i="1" dirty="0" smtClean="0">
+                            <a:ln>
+                              <a:solidFill>
+                                <a:schemeClr val="bg2">
+                                  <a:lumMod val="50000"/>
+                                  <a:alpha val="15000"/>
+                                </a:schemeClr>
+                              </a:solidFill>
+                            </a:ln>
+                            <a:solidFill>
+                              <a:schemeClr val="bg2">
+                                <a:lumMod val="50000"/>
+                              </a:schemeClr>
+                            </a:solidFill>
+                            <a:latin typeface="Cambria Math" panose="02040503050406030204" pitchFamily="18" charset="0"/>
+                            <a:ea typeface="나눔스퀘어" panose="020B0600000101010101" pitchFamily="50" charset="-127"/>
+                          </a:rPr>
+                          <m:t>4</m:t>
+                        </m:r>
+                      </m:sub>
+                    </m:sSub>
+                    <m:sSub>
+                      <m:sSubPr>
+                        <m:ctrlPr>
+                          <a:rPr lang="en-US" altLang="ko-KR" sz="1600" i="1" dirty="0" smtClean="0">
+                            <a:ln>
+                              <a:solidFill>
+                                <a:schemeClr val="bg2">
+                                  <a:lumMod val="50000"/>
+                                  <a:alpha val="15000"/>
+                                </a:schemeClr>
+                              </a:solidFill>
+                            </a:ln>
+                            <a:solidFill>
+                              <a:schemeClr val="bg2">
+                                <a:lumMod val="50000"/>
+                              </a:schemeClr>
+                            </a:solidFill>
+                            <a:latin typeface="Cambria Math" panose="02040503050406030204" pitchFamily="18" charset="0"/>
+                            <a:ea typeface="나눔스퀘어" panose="020B0600000101010101" pitchFamily="50" charset="-127"/>
+                          </a:rPr>
+                        </m:ctrlPr>
+                      </m:sSubPr>
+                      <m:e>
+                        <m:r>
+                          <a:rPr lang="en-US" altLang="ko-KR" sz="1600" b="0" i="1" dirty="0" smtClean="0">
+                            <a:ln>
+                              <a:solidFill>
+                                <a:schemeClr val="bg2">
+                                  <a:lumMod val="50000"/>
+                                  <a:alpha val="15000"/>
+                                </a:schemeClr>
+                              </a:solidFill>
+                            </a:ln>
+                            <a:solidFill>
+                              <a:schemeClr val="bg2">
+                                <a:lumMod val="50000"/>
+                              </a:schemeClr>
+                            </a:solidFill>
+                            <a:latin typeface="Cambria Math" panose="02040503050406030204" pitchFamily="18" charset="0"/>
+                            <a:ea typeface="나눔스퀘어" panose="020B0600000101010101" pitchFamily="50" charset="-127"/>
+                          </a:rPr>
+                          <m:t>−</m:t>
+                        </m:r>
+                        <m:r>
+                          <a:rPr lang="en-US" altLang="ko-KR" sz="1600" b="0" i="1" dirty="0" smtClean="0">
+                            <a:ln>
+                              <a:solidFill>
+                                <a:schemeClr val="bg2">
+                                  <a:lumMod val="50000"/>
+                                  <a:alpha val="15000"/>
+                                </a:schemeClr>
+                              </a:solidFill>
+                            </a:ln>
+                            <a:solidFill>
+                              <a:schemeClr val="bg2">
+                                <a:lumMod val="50000"/>
+                              </a:schemeClr>
+                            </a:solidFill>
+                            <a:latin typeface="Cambria Math" panose="02040503050406030204" pitchFamily="18" charset="0"/>
+                            <a:ea typeface="나눔스퀘어" panose="020B0600000101010101" pitchFamily="50" charset="-127"/>
+                          </a:rPr>
+                          <m:t>𝑤</m:t>
+                        </m:r>
+                      </m:e>
+                      <m:sub>
+                        <m:r>
+                          <a:rPr lang="en-US" altLang="ko-KR" sz="1600" b="0" i="1" dirty="0" smtClean="0">
+                            <a:ln>
+                              <a:solidFill>
+                                <a:schemeClr val="bg2">
+                                  <a:lumMod val="50000"/>
+                                  <a:alpha val="15000"/>
+                                </a:schemeClr>
+                              </a:solidFill>
+                            </a:ln>
+                            <a:solidFill>
+                              <a:schemeClr val="bg2">
+                                <a:lumMod val="50000"/>
+                              </a:schemeClr>
+                            </a:solidFill>
+                            <a:latin typeface="Cambria Math" panose="02040503050406030204" pitchFamily="18" charset="0"/>
+                            <a:ea typeface="나눔스퀘어" panose="020B0600000101010101" pitchFamily="50" charset="-127"/>
+                          </a:rPr>
+                          <m:t>𝑖</m:t>
+                        </m:r>
+                        <m:r>
+                          <a:rPr lang="en-US" altLang="ko-KR" sz="1600" b="0" i="1" dirty="0" smtClean="0">
+                            <a:ln>
+                              <a:solidFill>
+                                <a:schemeClr val="bg2">
+                                  <a:lumMod val="50000"/>
+                                  <a:alpha val="15000"/>
+                                </a:schemeClr>
+                              </a:solidFill>
+                            </a:ln>
+                            <a:solidFill>
+                              <a:schemeClr val="bg2">
+                                <a:lumMod val="50000"/>
+                              </a:schemeClr>
+                            </a:solidFill>
+                            <a:latin typeface="Cambria Math" panose="02040503050406030204" pitchFamily="18" charset="0"/>
+                            <a:ea typeface="나눔스퀘어" panose="020B0600000101010101" pitchFamily="50" charset="-127"/>
+                          </a:rPr>
+                          <m:t>5</m:t>
+                        </m:r>
+                      </m:sub>
+                    </m:sSub>
+                    <m:r>
+                      <a:rPr lang="en-US" altLang="ko-KR" sz="1600" b="0" i="1" dirty="0" smtClean="0">
+                        <a:ln>
+                          <a:solidFill>
+                            <a:schemeClr val="bg2">
+                              <a:lumMod val="50000"/>
+                              <a:alpha val="15000"/>
+                            </a:schemeClr>
+                          </a:solidFill>
+                        </a:ln>
+                        <a:solidFill>
+                          <a:schemeClr val="bg2">
+                            <a:lumMod val="50000"/>
+                          </a:schemeClr>
+                        </a:solidFill>
+                        <a:latin typeface="Cambria Math" panose="02040503050406030204" pitchFamily="18" charset="0"/>
+                        <a:ea typeface="나눔스퀘어" panose="020B0600000101010101" pitchFamily="50" charset="-127"/>
+                      </a:rPr>
+                      <m:t>)</m:t>
+                    </m:r>
+                  </m:oMath>
+                </a14:m>
+                <a:endParaRPr lang="en-US" altLang="ko-KR" sz="1600" dirty="0">
+                  <a:ln>
+                    <a:solidFill>
+                      <a:schemeClr val="bg2">
+                        <a:lumMod val="50000"/>
+                        <a:alpha val="15000"/>
+                      </a:schemeClr>
+                    </a:solidFill>
+                  </a:ln>
+                  <a:solidFill>
+                    <a:schemeClr val="bg2">
+                      <a:lumMod val="50000"/>
+                    </a:schemeClr>
+                  </a:solidFill>
+                  <a:latin typeface="나눔스퀘어" panose="020B0600000101010101" pitchFamily="50" charset="-127"/>
+                  <a:ea typeface="나눔스퀘어" panose="020B0600000101010101" pitchFamily="50" charset="-127"/>
+                  <a:cs typeface="조선일보명조" panose="02030304000000000000" pitchFamily="18" charset="-127"/>
+                </a:endParaRPr>
+              </a:p>
+              <a:p>
+                <a:pPr>
+                  <a:lnSpc>
+                    <a:spcPct val="150000"/>
+                  </a:lnSpc>
+                </a:pPr>
+                <a:endParaRPr lang="en-US" altLang="ko-KR" sz="1600" dirty="0">
+                  <a:ln>
+                    <a:solidFill>
+                      <a:schemeClr val="bg2">
+                        <a:lumMod val="50000"/>
+                        <a:alpha val="15000"/>
+                      </a:schemeClr>
+                    </a:solidFill>
+                  </a:ln>
+                  <a:solidFill>
+                    <a:schemeClr val="bg2">
+                      <a:lumMod val="50000"/>
+                    </a:schemeClr>
+                  </a:solidFill>
+                  <a:latin typeface="나눔스퀘어" panose="020B0600000101010101" pitchFamily="50" charset="-127"/>
+                  <a:ea typeface="나눔스퀘어" panose="020B0600000101010101" pitchFamily="50" charset="-127"/>
+                  <a:cs typeface="조선일보명조" panose="02030304000000000000" pitchFamily="18" charset="-127"/>
+                </a:endParaRPr>
+              </a:p>
+              <a:p>
+                <a:pPr>
+                  <a:lnSpc>
+                    <a:spcPct val="150000"/>
+                  </a:lnSpc>
+                </a:pPr>
+                <a:r>
+                  <a:rPr lang="en-US" altLang="ko-KR" sz="1600" dirty="0">
+                    <a:ln>
+                      <a:solidFill>
+                        <a:schemeClr val="bg2">
+                          <a:lumMod val="50000"/>
+                          <a:alpha val="15000"/>
+                        </a:schemeClr>
+                      </a:solidFill>
+                    </a:ln>
+                    <a:solidFill>
+                      <a:schemeClr val="bg2">
+                        <a:lumMod val="50000"/>
+                      </a:schemeClr>
+                    </a:solidFill>
+                    <a:latin typeface="나눔스퀘어" panose="020B0600000101010101" pitchFamily="50" charset="-127"/>
+                    <a:ea typeface="나눔스퀘어" panose="020B0600000101010101" pitchFamily="50" charset="-127"/>
+                    <a:cs typeface="조선일보명조" panose="02030304000000000000" pitchFamily="18" charset="-127"/>
+                  </a:rPr>
+                  <a:t>Step 4. </a:t>
+                </a:r>
+                <a:r>
+                  <a:rPr lang="en-US" altLang="ko-KR" sz="1600" dirty="0" err="1">
+                    <a:ln>
+                      <a:solidFill>
+                        <a:schemeClr val="bg2">
+                          <a:lumMod val="50000"/>
+                          <a:alpha val="15000"/>
+                        </a:schemeClr>
+                      </a:solidFill>
+                    </a:ln>
+                    <a:solidFill>
+                      <a:schemeClr val="bg2">
+                        <a:lumMod val="50000"/>
+                      </a:schemeClr>
+                    </a:solidFill>
+                    <a:latin typeface="나눔스퀘어" panose="020B0600000101010101" pitchFamily="50" charset="-127"/>
+                    <a:ea typeface="나눔스퀘어" panose="020B0600000101010101" pitchFamily="50" charset="-127"/>
+                    <a:cs typeface="조선일보명조" panose="02030304000000000000" pitchFamily="18" charset="-127"/>
+                  </a:rPr>
+                  <a:t>Softmax</a:t>
+                </a:r>
+                <a:r>
+                  <a:rPr lang="en-US" altLang="ko-KR" sz="1600" dirty="0">
+                    <a:ln>
+                      <a:solidFill>
+                        <a:schemeClr val="bg2">
+                          <a:lumMod val="50000"/>
+                          <a:alpha val="15000"/>
+                        </a:schemeClr>
+                      </a:solidFill>
+                    </a:ln>
+                    <a:solidFill>
+                      <a:schemeClr val="bg2">
+                        <a:lumMod val="50000"/>
+                      </a:schemeClr>
+                    </a:solidFill>
+                    <a:latin typeface="나눔스퀘어" panose="020B0600000101010101" pitchFamily="50" charset="-127"/>
+                    <a:ea typeface="나눔스퀘어" panose="020B0600000101010101" pitchFamily="50" charset="-127"/>
+                    <a:cs typeface="조선일보명조" panose="02030304000000000000" pitchFamily="18" charset="-127"/>
+                  </a:rPr>
+                  <a:t> </a:t>
+                </a:r>
+                <a:r>
+                  <a:rPr lang="ko-KR" altLang="en-US" sz="1600" dirty="0">
+                    <a:ln>
+                      <a:solidFill>
+                        <a:schemeClr val="bg2">
+                          <a:lumMod val="50000"/>
+                          <a:alpha val="15000"/>
+                        </a:schemeClr>
+                      </a:solidFill>
+                    </a:ln>
+                    <a:solidFill>
+                      <a:schemeClr val="bg2">
+                        <a:lumMod val="50000"/>
+                      </a:schemeClr>
+                    </a:solidFill>
+                    <a:latin typeface="나눔스퀘어" panose="020B0600000101010101" pitchFamily="50" charset="-127"/>
+                    <a:ea typeface="나눔스퀘어" panose="020B0600000101010101" pitchFamily="50" charset="-127"/>
+                    <a:cs typeface="조선일보명조" panose="02030304000000000000" pitchFamily="18" charset="-127"/>
+                  </a:rPr>
+                  <a:t>함수를 이용해 각 지역의 비율 계산</a:t>
+                </a:r>
+                <a:endParaRPr lang="en-US" altLang="ko-KR" sz="1600" dirty="0">
+                  <a:ln>
+                    <a:solidFill>
+                      <a:schemeClr val="bg2">
+                        <a:lumMod val="50000"/>
+                        <a:alpha val="15000"/>
+                      </a:schemeClr>
+                    </a:solidFill>
+                  </a:ln>
+                  <a:solidFill>
+                    <a:schemeClr val="bg2">
+                      <a:lumMod val="50000"/>
+                    </a:schemeClr>
+                  </a:solidFill>
+                  <a:latin typeface="나눔스퀘어" panose="020B0600000101010101" pitchFamily="50" charset="-127"/>
+                  <a:ea typeface="나눔스퀘어" panose="020B0600000101010101" pitchFamily="50" charset="-127"/>
+                  <a:cs typeface="조선일보명조" panose="02030304000000000000" pitchFamily="18" charset="-127"/>
+                </a:endParaRPr>
+              </a:p>
+              <a:p>
+                <a:pPr>
+                  <a:lnSpc>
+                    <a:spcPct val="150000"/>
+                  </a:lnSpc>
+                </a:pPr>
+                <a:r>
+                  <a:rPr lang="en-US" altLang="ko-KR" sz="1600" dirty="0">
+                    <a:ln>
+                      <a:solidFill>
+                        <a:schemeClr val="bg2">
+                          <a:lumMod val="50000"/>
+                          <a:alpha val="15000"/>
+                        </a:schemeClr>
+                      </a:solidFill>
+                    </a:ln>
+                    <a:solidFill>
+                      <a:schemeClr val="bg2">
+                        <a:lumMod val="50000"/>
+                      </a:schemeClr>
+                    </a:solidFill>
+                    <a:latin typeface="나눔스퀘어" panose="020B0600000101010101" pitchFamily="50" charset="-127"/>
+                    <a:ea typeface="나눔스퀘어" panose="020B0600000101010101" pitchFamily="50" charset="-127"/>
+                    <a:cs typeface="조선일보명조" panose="02030304000000000000" pitchFamily="18" charset="-127"/>
+                  </a:rPr>
+                  <a:t>	(</a:t>
+                </a:r>
+                <a14:m>
+                  <m:oMath xmlns:m="http://schemas.openxmlformats.org/officeDocument/2006/math">
+                    <m:sSub>
+                      <m:sSubPr>
+                        <m:ctrlPr>
+                          <a:rPr lang="en-US" altLang="ko-KR" sz="1600" i="1" smtClean="0">
+                            <a:ln>
+                              <a:solidFill>
+                                <a:schemeClr val="bg2">
+                                  <a:lumMod val="50000"/>
+                                  <a:alpha val="15000"/>
+                                </a:schemeClr>
+                              </a:solidFill>
+                            </a:ln>
+                            <a:solidFill>
+                              <a:schemeClr val="bg2">
+                                <a:lumMod val="50000"/>
+                              </a:schemeClr>
+                            </a:solidFill>
+                            <a:latin typeface="Cambria Math" panose="02040503050406030204" pitchFamily="18" charset="0"/>
+                            <a:ea typeface="나눔스퀘어" panose="020B0600000101010101" pitchFamily="50" charset="-127"/>
+                          </a:rPr>
+                        </m:ctrlPr>
+                      </m:sSubPr>
+                      <m:e>
+                        <m:r>
+                          <a:rPr lang="en-US" altLang="ko-KR" sz="1600" b="0" i="1" smtClean="0">
+                            <a:ln>
+                              <a:solidFill>
+                                <a:schemeClr val="bg2">
+                                  <a:lumMod val="50000"/>
+                                  <a:alpha val="15000"/>
+                                </a:schemeClr>
+                              </a:solidFill>
+                            </a:ln>
+                            <a:solidFill>
+                              <a:schemeClr val="bg2">
+                                <a:lumMod val="50000"/>
+                              </a:schemeClr>
+                            </a:solidFill>
+                            <a:latin typeface="Cambria Math" panose="02040503050406030204" pitchFamily="18" charset="0"/>
+                            <a:ea typeface="나눔스퀘어" panose="020B0600000101010101" pitchFamily="50" charset="-127"/>
+                          </a:rPr>
+                          <m:t>𝑆</m:t>
+                        </m:r>
+                      </m:e>
+                      <m:sub>
+                        <m:r>
+                          <a:rPr lang="en-US" altLang="ko-KR" sz="1600" b="0" i="1" smtClean="0">
+                            <a:ln>
+                              <a:solidFill>
+                                <a:schemeClr val="bg2">
+                                  <a:lumMod val="50000"/>
+                                  <a:alpha val="15000"/>
+                                </a:schemeClr>
+                              </a:solidFill>
+                            </a:ln>
+                            <a:solidFill>
+                              <a:schemeClr val="bg2">
+                                <a:lumMod val="50000"/>
+                              </a:schemeClr>
+                            </a:solidFill>
+                            <a:latin typeface="Cambria Math" panose="02040503050406030204" pitchFamily="18" charset="0"/>
+                            <a:ea typeface="나눔스퀘어" panose="020B0600000101010101" pitchFamily="50" charset="-127"/>
+                          </a:rPr>
+                          <m:t>𝑘</m:t>
+                        </m:r>
+                      </m:sub>
+                    </m:sSub>
+                    <m:r>
+                      <a:rPr lang="en-US" altLang="ko-KR" sz="1600" b="0" i="1" smtClean="0">
+                        <a:ln>
+                          <a:solidFill>
+                            <a:schemeClr val="bg2">
+                              <a:lumMod val="50000"/>
+                              <a:alpha val="15000"/>
+                            </a:schemeClr>
+                          </a:solidFill>
+                        </a:ln>
+                        <a:solidFill>
+                          <a:schemeClr val="bg2">
+                            <a:lumMod val="50000"/>
+                          </a:schemeClr>
+                        </a:solidFill>
+                        <a:latin typeface="Cambria Math" panose="02040503050406030204" pitchFamily="18" charset="0"/>
+                        <a:ea typeface="나눔스퀘어" panose="020B0600000101010101" pitchFamily="50" charset="-127"/>
+                      </a:rPr>
+                      <m:t>=</m:t>
+                    </m:r>
+                    <m:f>
+                      <m:fPr>
+                        <m:ctrlPr>
+                          <a:rPr lang="en-US" altLang="ko-KR" sz="1600" b="0" i="1" smtClean="0">
+                            <a:ln>
+                              <a:solidFill>
+                                <a:schemeClr val="bg2">
+                                  <a:lumMod val="50000"/>
+                                  <a:alpha val="15000"/>
+                                </a:schemeClr>
+                              </a:solidFill>
+                            </a:ln>
+                            <a:solidFill>
+                              <a:schemeClr val="bg2">
+                                <a:lumMod val="50000"/>
+                              </a:schemeClr>
+                            </a:solidFill>
+                            <a:latin typeface="Cambria Math" panose="02040503050406030204" pitchFamily="18" charset="0"/>
+                            <a:ea typeface="나눔스퀘어" panose="020B0600000101010101" pitchFamily="50" charset="-127"/>
+                          </a:rPr>
+                        </m:ctrlPr>
+                      </m:fPr>
+                      <m:num>
+                        <m:r>
+                          <m:rPr>
+                            <m:sty m:val="p"/>
+                          </m:rPr>
+                          <a:rPr lang="en-US" altLang="ko-KR" sz="1600" b="0" i="0" smtClean="0">
+                            <a:ln>
+                              <a:solidFill>
+                                <a:schemeClr val="bg2">
+                                  <a:lumMod val="50000"/>
+                                  <a:alpha val="15000"/>
+                                </a:schemeClr>
+                              </a:solidFill>
+                            </a:ln>
+                            <a:solidFill>
+                              <a:schemeClr val="bg2">
+                                <a:lumMod val="50000"/>
+                              </a:schemeClr>
+                            </a:solidFill>
+                            <a:latin typeface="Cambria Math" panose="02040503050406030204" pitchFamily="18" charset="0"/>
+                            <a:ea typeface="나눔스퀘어" panose="020B0600000101010101" pitchFamily="50" charset="-127"/>
+                          </a:rPr>
+                          <m:t>exp</m:t>
+                        </m:r>
+                        <m:r>
+                          <a:rPr lang="en-US" altLang="ko-KR" sz="1600" b="0" i="1" smtClean="0">
+                            <a:ln>
+                              <a:solidFill>
+                                <a:schemeClr val="bg2">
+                                  <a:lumMod val="50000"/>
+                                  <a:alpha val="15000"/>
+                                </a:schemeClr>
+                              </a:solidFill>
+                            </a:ln>
+                            <a:solidFill>
+                              <a:schemeClr val="bg2">
+                                <a:lumMod val="50000"/>
+                              </a:schemeClr>
+                            </a:solidFill>
+                            <a:latin typeface="Cambria Math" panose="02040503050406030204" pitchFamily="18" charset="0"/>
+                            <a:ea typeface="나눔스퀘어" panose="020B0600000101010101" pitchFamily="50" charset="-127"/>
+                          </a:rPr>
+                          <m:t>⁡(</m:t>
+                        </m:r>
+                        <m:sSub>
+                          <m:sSubPr>
+                            <m:ctrlPr>
+                              <a:rPr lang="en-US" altLang="ko-KR" sz="1600" b="0" i="1" smtClean="0">
+                                <a:ln>
+                                  <a:solidFill>
+                                    <a:schemeClr val="bg2">
+                                      <a:lumMod val="50000"/>
+                                      <a:alpha val="15000"/>
+                                    </a:schemeClr>
+                                  </a:solidFill>
+                                </a:ln>
+                                <a:solidFill>
+                                  <a:schemeClr val="bg2">
+                                    <a:lumMod val="50000"/>
+                                  </a:schemeClr>
+                                </a:solidFill>
+                                <a:latin typeface="Cambria Math" panose="02040503050406030204" pitchFamily="18" charset="0"/>
+                                <a:ea typeface="나눔스퀘어" panose="020B0600000101010101" pitchFamily="50" charset="-127"/>
+                              </a:rPr>
+                            </m:ctrlPr>
+                          </m:sSubPr>
+                          <m:e>
+                            <m:r>
+                              <a:rPr lang="en-US" altLang="ko-KR" sz="1600" b="0" i="1" smtClean="0">
+                                <a:ln>
+                                  <a:solidFill>
+                                    <a:schemeClr val="bg2">
+                                      <a:lumMod val="50000"/>
+                                      <a:alpha val="15000"/>
+                                    </a:schemeClr>
+                                  </a:solidFill>
+                                </a:ln>
+                                <a:solidFill>
+                                  <a:schemeClr val="bg2">
+                                    <a:lumMod val="50000"/>
+                                  </a:schemeClr>
+                                </a:solidFill>
+                                <a:latin typeface="Cambria Math" panose="02040503050406030204" pitchFamily="18" charset="0"/>
+                                <a:ea typeface="나눔스퀘어" panose="020B0600000101010101" pitchFamily="50" charset="-127"/>
+                              </a:rPr>
+                              <m:t>𝑤</m:t>
+                            </m:r>
+                          </m:e>
+                          <m:sub>
+                            <m:r>
+                              <a:rPr lang="en-US" altLang="ko-KR" sz="1600" b="0" i="1" smtClean="0">
+                                <a:ln>
+                                  <a:solidFill>
+                                    <a:schemeClr val="bg2">
+                                      <a:lumMod val="50000"/>
+                                      <a:alpha val="15000"/>
+                                    </a:schemeClr>
+                                  </a:solidFill>
+                                </a:ln>
+                                <a:solidFill>
+                                  <a:schemeClr val="bg2">
+                                    <a:lumMod val="50000"/>
+                                  </a:schemeClr>
+                                </a:solidFill>
+                                <a:latin typeface="Cambria Math" panose="02040503050406030204" pitchFamily="18" charset="0"/>
+                                <a:ea typeface="나눔스퀘어" panose="020B0600000101010101" pitchFamily="50" charset="-127"/>
+                              </a:rPr>
+                              <m:t>𝑘</m:t>
+                            </m:r>
+                          </m:sub>
+                        </m:sSub>
+                        <m:r>
+                          <a:rPr lang="en-US" altLang="ko-KR" sz="1600" b="0" i="1" smtClean="0">
+                            <a:ln>
+                              <a:solidFill>
+                                <a:schemeClr val="bg2">
+                                  <a:lumMod val="50000"/>
+                                  <a:alpha val="15000"/>
+                                </a:schemeClr>
+                              </a:solidFill>
+                            </a:ln>
+                            <a:solidFill>
+                              <a:schemeClr val="bg2">
+                                <a:lumMod val="50000"/>
+                              </a:schemeClr>
+                            </a:solidFill>
+                            <a:latin typeface="Cambria Math" panose="02040503050406030204" pitchFamily="18" charset="0"/>
+                            <a:ea typeface="나눔스퀘어" panose="020B0600000101010101" pitchFamily="50" charset="-127"/>
+                          </a:rPr>
+                          <m:t>)</m:t>
+                        </m:r>
+                      </m:num>
+                      <m:den>
+                        <m:nary>
+                          <m:naryPr>
+                            <m:chr m:val="∑"/>
+                            <m:ctrlPr>
+                              <a:rPr lang="en-US" altLang="ko-KR" sz="1600" b="0" i="1" smtClean="0">
+                                <a:ln>
+                                  <a:solidFill>
+                                    <a:schemeClr val="bg2">
+                                      <a:lumMod val="50000"/>
+                                      <a:alpha val="15000"/>
+                                    </a:schemeClr>
+                                  </a:solidFill>
+                                </a:ln>
+                                <a:solidFill>
+                                  <a:schemeClr val="bg2">
+                                    <a:lumMod val="50000"/>
+                                  </a:schemeClr>
+                                </a:solidFill>
+                                <a:latin typeface="Cambria Math" panose="02040503050406030204" pitchFamily="18" charset="0"/>
+                                <a:ea typeface="나눔스퀘어" panose="020B0600000101010101" pitchFamily="50" charset="-127"/>
+                              </a:rPr>
+                            </m:ctrlPr>
+                          </m:naryPr>
+                          <m:sub>
+                            <m:r>
+                              <m:rPr>
+                                <m:brk m:alnAt="23"/>
+                              </m:rPr>
+                              <a:rPr lang="en-US" altLang="ko-KR" sz="1600" b="0" i="1" smtClean="0">
+                                <a:ln>
+                                  <a:solidFill>
+                                    <a:schemeClr val="bg2">
+                                      <a:lumMod val="50000"/>
+                                      <a:alpha val="15000"/>
+                                    </a:schemeClr>
+                                  </a:solidFill>
+                                </a:ln>
+                                <a:solidFill>
+                                  <a:schemeClr val="bg2">
+                                    <a:lumMod val="50000"/>
+                                  </a:schemeClr>
+                                </a:solidFill>
+                                <a:latin typeface="Cambria Math" panose="02040503050406030204" pitchFamily="18" charset="0"/>
+                                <a:ea typeface="나눔스퀘어" panose="020B0600000101010101" pitchFamily="50" charset="-127"/>
+                              </a:rPr>
+                              <m:t>𝑖</m:t>
+                            </m:r>
+                            <m:r>
+                              <a:rPr lang="en-US" altLang="ko-KR" sz="1600" b="0" i="1" smtClean="0">
+                                <a:ln>
+                                  <a:solidFill>
+                                    <a:schemeClr val="bg2">
+                                      <a:lumMod val="50000"/>
+                                      <a:alpha val="15000"/>
+                                    </a:schemeClr>
+                                  </a:solidFill>
+                                </a:ln>
+                                <a:solidFill>
+                                  <a:schemeClr val="bg2">
+                                    <a:lumMod val="50000"/>
+                                  </a:schemeClr>
+                                </a:solidFill>
+                                <a:latin typeface="Cambria Math" panose="02040503050406030204" pitchFamily="18" charset="0"/>
+                                <a:ea typeface="나눔스퀘어" panose="020B0600000101010101" pitchFamily="50" charset="-127"/>
+                              </a:rPr>
+                              <m:t>=1</m:t>
+                            </m:r>
+                          </m:sub>
+                          <m:sup>
+                            <m:r>
+                              <a:rPr lang="en-US" altLang="ko-KR" sz="1600" b="0" i="1" smtClean="0">
+                                <a:ln>
+                                  <a:solidFill>
+                                    <a:schemeClr val="bg2">
+                                      <a:lumMod val="50000"/>
+                                      <a:alpha val="15000"/>
+                                    </a:schemeClr>
+                                  </a:solidFill>
+                                </a:ln>
+                                <a:solidFill>
+                                  <a:schemeClr val="bg2">
+                                    <a:lumMod val="50000"/>
+                                  </a:schemeClr>
+                                </a:solidFill>
+                                <a:latin typeface="Cambria Math" panose="02040503050406030204" pitchFamily="18" charset="0"/>
+                                <a:ea typeface="나눔스퀘어" panose="020B0600000101010101" pitchFamily="50" charset="-127"/>
+                              </a:rPr>
+                              <m:t>7</m:t>
+                            </m:r>
+                          </m:sup>
+                          <m:e>
+                            <m:r>
+                              <m:rPr>
+                                <m:sty m:val="p"/>
+                              </m:rPr>
+                              <a:rPr lang="en-US" altLang="ko-KR" sz="1600" b="0" i="0" smtClean="0">
+                                <a:ln>
+                                  <a:solidFill>
+                                    <a:schemeClr val="bg2">
+                                      <a:lumMod val="50000"/>
+                                      <a:alpha val="15000"/>
+                                    </a:schemeClr>
+                                  </a:solidFill>
+                                </a:ln>
+                                <a:solidFill>
+                                  <a:schemeClr val="bg2">
+                                    <a:lumMod val="50000"/>
+                                  </a:schemeClr>
+                                </a:solidFill>
+                                <a:latin typeface="Cambria Math" panose="02040503050406030204" pitchFamily="18" charset="0"/>
+                                <a:ea typeface="나눔스퀘어" panose="020B0600000101010101" pitchFamily="50" charset="-127"/>
+                              </a:rPr>
+                              <m:t>exp</m:t>
+                            </m:r>
+                            <m:r>
+                              <a:rPr lang="en-US" altLang="ko-KR" sz="1600" b="0" i="1" smtClean="0">
+                                <a:ln>
+                                  <a:solidFill>
+                                    <a:schemeClr val="bg2">
+                                      <a:lumMod val="50000"/>
+                                      <a:alpha val="15000"/>
+                                    </a:schemeClr>
+                                  </a:solidFill>
+                                </a:ln>
+                                <a:solidFill>
+                                  <a:schemeClr val="bg2">
+                                    <a:lumMod val="50000"/>
+                                  </a:schemeClr>
+                                </a:solidFill>
+                                <a:latin typeface="Cambria Math" panose="02040503050406030204" pitchFamily="18" charset="0"/>
+                                <a:ea typeface="나눔스퀘어" panose="020B0600000101010101" pitchFamily="50" charset="-127"/>
+                              </a:rPr>
+                              <m:t>⁡(</m:t>
+                            </m:r>
+                            <m:sSub>
+                              <m:sSubPr>
+                                <m:ctrlPr>
+                                  <a:rPr lang="en-US" altLang="ko-KR" sz="1600" b="0" i="1" smtClean="0">
+                                    <a:ln>
+                                      <a:solidFill>
+                                        <a:schemeClr val="bg2">
+                                          <a:lumMod val="50000"/>
+                                          <a:alpha val="15000"/>
+                                        </a:schemeClr>
+                                      </a:solidFill>
+                                    </a:ln>
+                                    <a:solidFill>
+                                      <a:schemeClr val="bg2">
+                                        <a:lumMod val="50000"/>
+                                      </a:schemeClr>
+                                    </a:solidFill>
+                                    <a:latin typeface="Cambria Math" panose="02040503050406030204" pitchFamily="18" charset="0"/>
+                                    <a:ea typeface="나눔스퀘어" panose="020B0600000101010101" pitchFamily="50" charset="-127"/>
+                                  </a:rPr>
+                                </m:ctrlPr>
+                              </m:sSubPr>
+                              <m:e>
+                                <m:r>
+                                  <a:rPr lang="en-US" altLang="ko-KR" sz="1600" b="0" i="1" smtClean="0">
+                                    <a:ln>
+                                      <a:solidFill>
+                                        <a:schemeClr val="bg2">
+                                          <a:lumMod val="50000"/>
+                                          <a:alpha val="15000"/>
+                                        </a:schemeClr>
+                                      </a:solidFill>
+                                    </a:ln>
+                                    <a:solidFill>
+                                      <a:schemeClr val="bg2">
+                                        <a:lumMod val="50000"/>
+                                      </a:schemeClr>
+                                    </a:solidFill>
+                                    <a:latin typeface="Cambria Math" panose="02040503050406030204" pitchFamily="18" charset="0"/>
+                                    <a:ea typeface="나눔스퀘어" panose="020B0600000101010101" pitchFamily="50" charset="-127"/>
+                                  </a:rPr>
+                                  <m:t>𝑤</m:t>
+                                </m:r>
+                              </m:e>
+                              <m:sub>
+                                <m:r>
+                                  <a:rPr lang="en-US" altLang="ko-KR" sz="1600" b="0" i="1" smtClean="0">
+                                    <a:ln>
+                                      <a:solidFill>
+                                        <a:schemeClr val="bg2">
+                                          <a:lumMod val="50000"/>
+                                          <a:alpha val="15000"/>
+                                        </a:schemeClr>
+                                      </a:solidFill>
+                                    </a:ln>
+                                    <a:solidFill>
+                                      <a:schemeClr val="bg2">
+                                        <a:lumMod val="50000"/>
+                                      </a:schemeClr>
+                                    </a:solidFill>
+                                    <a:latin typeface="Cambria Math" panose="02040503050406030204" pitchFamily="18" charset="0"/>
+                                    <a:ea typeface="나눔스퀘어" panose="020B0600000101010101" pitchFamily="50" charset="-127"/>
+                                  </a:rPr>
+                                  <m:t>𝑖</m:t>
+                                </m:r>
+                              </m:sub>
+                            </m:sSub>
+                            <m:r>
+                              <a:rPr lang="en-US" altLang="ko-KR" sz="1600" b="0" i="1" smtClean="0">
+                                <a:ln>
+                                  <a:solidFill>
+                                    <a:schemeClr val="bg2">
+                                      <a:lumMod val="50000"/>
+                                      <a:alpha val="15000"/>
+                                    </a:schemeClr>
+                                  </a:solidFill>
+                                </a:ln>
+                                <a:solidFill>
+                                  <a:schemeClr val="bg2">
+                                    <a:lumMod val="50000"/>
+                                  </a:schemeClr>
+                                </a:solidFill>
+                                <a:latin typeface="Cambria Math" panose="02040503050406030204" pitchFamily="18" charset="0"/>
+                                <a:ea typeface="나눔스퀘어" panose="020B0600000101010101" pitchFamily="50" charset="-127"/>
+                              </a:rPr>
+                              <m:t>)</m:t>
+                            </m:r>
+                          </m:e>
+                        </m:nary>
+                      </m:den>
+                    </m:f>
+                  </m:oMath>
+                </a14:m>
+                <a:r>
+                  <a:rPr lang="en-US" altLang="ko-KR" sz="1600" dirty="0">
+                    <a:ln>
+                      <a:solidFill>
+                        <a:schemeClr val="bg2">
+                          <a:lumMod val="50000"/>
+                          <a:alpha val="15000"/>
+                        </a:schemeClr>
+                      </a:solidFill>
+                    </a:ln>
+                    <a:solidFill>
+                      <a:schemeClr val="bg2">
+                        <a:lumMod val="50000"/>
+                      </a:schemeClr>
+                    </a:solidFill>
+                    <a:latin typeface="나눔스퀘어" panose="020B0600000101010101" pitchFamily="50" charset="-127"/>
+                    <a:ea typeface="나눔스퀘어" panose="020B0600000101010101" pitchFamily="50" charset="-127"/>
+                    <a:cs typeface="조선일보명조" panose="02030304000000000000" pitchFamily="18" charset="-127"/>
+                  </a:rPr>
+                  <a:t>, </a:t>
+                </a:r>
+                <a14:m>
+                  <m:oMath xmlns:m="http://schemas.openxmlformats.org/officeDocument/2006/math">
+                    <m:r>
+                      <a:rPr lang="en-US" altLang="ko-KR" sz="1600" b="0" i="1" smtClean="0">
+                        <a:ln>
+                          <a:solidFill>
+                            <a:schemeClr val="bg2">
+                              <a:lumMod val="50000"/>
+                              <a:alpha val="15000"/>
+                            </a:schemeClr>
+                          </a:solidFill>
+                        </a:ln>
+                        <a:solidFill>
+                          <a:schemeClr val="bg2">
+                            <a:lumMod val="50000"/>
+                          </a:schemeClr>
+                        </a:solidFill>
+                        <a:latin typeface="Cambria Math" panose="02040503050406030204" pitchFamily="18" charset="0"/>
+                        <a:ea typeface="나눔스퀘어" panose="020B0600000101010101" pitchFamily="50" charset="-127"/>
+                        <a:cs typeface="조선일보명조" panose="02030304000000000000" pitchFamily="18" charset="-127"/>
+                      </a:rPr>
+                      <m:t>𝑘</m:t>
+                    </m:r>
+                    <m:r>
+                      <a:rPr lang="en-US" altLang="ko-KR" sz="1600" b="0" i="1" smtClean="0">
+                        <a:ln>
+                          <a:solidFill>
+                            <a:schemeClr val="bg2">
+                              <a:lumMod val="50000"/>
+                              <a:alpha val="15000"/>
+                            </a:schemeClr>
+                          </a:solidFill>
+                        </a:ln>
+                        <a:solidFill>
+                          <a:schemeClr val="bg2">
+                            <a:lumMod val="50000"/>
+                          </a:schemeClr>
+                        </a:solidFill>
+                        <a:latin typeface="Cambria Math" panose="02040503050406030204" pitchFamily="18" charset="0"/>
+                        <a:ea typeface="나눔스퀘어" panose="020B0600000101010101" pitchFamily="50" charset="-127"/>
+                        <a:cs typeface="조선일보명조" panose="02030304000000000000" pitchFamily="18" charset="-127"/>
+                      </a:rPr>
+                      <m:t>=1,2,3,4,5,6,7</m:t>
+                    </m:r>
+                  </m:oMath>
+                </a14:m>
+                <a:r>
+                  <a:rPr lang="en-US" altLang="ko-KR" sz="1600" dirty="0">
+                    <a:ln>
+                      <a:solidFill>
+                        <a:schemeClr val="bg2">
+                          <a:lumMod val="50000"/>
+                          <a:alpha val="15000"/>
+                        </a:schemeClr>
+                      </a:solidFill>
+                    </a:ln>
+                    <a:solidFill>
+                      <a:schemeClr val="bg2">
+                        <a:lumMod val="50000"/>
+                      </a:schemeClr>
+                    </a:solidFill>
+                    <a:latin typeface="나눔스퀘어" panose="020B0600000101010101" pitchFamily="50" charset="-127"/>
+                    <a:ea typeface="나눔스퀘어" panose="020B0600000101010101" pitchFamily="50" charset="-127"/>
+                    <a:cs typeface="조선일보명조" panose="02030304000000000000" pitchFamily="18" charset="-127"/>
+                  </a:rPr>
+                  <a:t>)</a:t>
+                </a:r>
+              </a:p>
+            </p:txBody>
+          </p:sp>
+        </mc:Choice>
+        <mc:Fallback>
+          <p:sp>
+            <p:nvSpPr>
+              <p:cNvPr id="15" name="TextBox 14">
+                <a:extLst>
+                  <a:ext uri="{FF2B5EF4-FFF2-40B4-BE49-F238E27FC236}">
+                    <a16:creationId xmlns:a16="http://schemas.microsoft.com/office/drawing/2014/main" id="{DE2B6FF6-ECA4-44AB-AA27-2193DB652C8B}"/>
+                  </a:ext>
+                </a:extLst>
+              </p:cNvPr>
+              <p:cNvSpPr txBox="1">
+                <a:spLocks noRot="1" noChangeAspect="1" noMove="1" noResize="1" noEditPoints="1" noAdjustHandles="1" noChangeArrowheads="1" noChangeShapeType="1" noTextEdit="1"/>
+              </p:cNvSpPr>
+              <p:nvPr/>
+            </p:nvSpPr>
+            <p:spPr>
+              <a:xfrm>
+                <a:off x="6489581" y="1754848"/>
+                <a:ext cx="5446113" cy="4110036"/>
+              </a:xfrm>
+              <a:prstGeom prst="rect">
+                <a:avLst/>
+              </a:prstGeom>
+              <a:blipFill>
+                <a:blip r:embed="rId2"/>
+                <a:stretch>
+                  <a:fillRect/>
+                </a:stretch>
+              </a:blipFill>
+            </p:spPr>
+            <p:txBody>
+              <a:bodyPr/>
+              <a:lstStyle/>
+              <a:p>
+                <a:r>
+                  <a:rPr lang="ko-KR" altLang="en-US">
+                    <a:noFill/>
+                  </a:rPr>
+                  <a:t> </a:t>
+                </a:r>
+              </a:p>
+            </p:txBody>
+          </p:sp>
+        </mc:Fallback>
+      </mc:AlternateContent>
     </p:spTree>
     <p:extLst>
       <p:ext uri="{BB962C8B-B14F-4D97-AF65-F5344CB8AC3E}">

</xml_diff>

<commit_message>
Complete without last page
</commit_message>
<xml_diff>
--- a/2021_UOS_Contest_1124.pptx
+++ b/2021_UOS_Contest_1124.pptx
@@ -4366,58 +4366,6 @@
       </p:sp>
       <p:sp>
         <p:nvSpPr>
-          <p:cNvPr id="5" name="TextBox 4">
-            <a:extLst>
-              <a:ext uri="{FF2B5EF4-FFF2-40B4-BE49-F238E27FC236}">
-                <a16:creationId xmlns:a16="http://schemas.microsoft.com/office/drawing/2014/main" id="{E878CB8F-1C88-4CEE-B5E4-87869F2885A6}"/>
-              </a:ext>
-            </a:extLst>
-          </p:cNvPr>
-          <p:cNvSpPr txBox="1"/>
-          <p:nvPr/>
-        </p:nvSpPr>
-        <p:spPr>
-          <a:xfrm>
-            <a:off x="861134" y="2512381"/>
-            <a:ext cx="3701988" cy="369332"/>
-          </a:xfrm>
-          <a:prstGeom prst="rect">
-            <a:avLst/>
-          </a:prstGeom>
-          <a:noFill/>
-        </p:spPr>
-        <p:txBody>
-          <a:bodyPr wrap="square" rtlCol="0">
-            <a:spAutoFit/>
-          </a:bodyPr>
-          <a:lstStyle/>
-          <a:p>
-            <a:r>
-              <a:rPr lang="ko-KR" altLang="en-US" dirty="0">
-                <a:solidFill>
-                  <a:srgbClr val="FF0000"/>
-                </a:solidFill>
-              </a:rPr>
-              <a:t>뉴스 </a:t>
-            </a:r>
-            <a:r>
-              <a:rPr lang="ko-KR" altLang="en-US">
-                <a:solidFill>
-                  <a:srgbClr val="FF0000"/>
-                </a:solidFill>
-              </a:rPr>
-              <a:t>기사 찾아보기</a:t>
-            </a:r>
-            <a:endParaRPr lang="ko-KR" altLang="en-US" dirty="0">
-              <a:solidFill>
-                <a:srgbClr val="FF0000"/>
-              </a:solidFill>
-            </a:endParaRPr>
-          </a:p>
-        </p:txBody>
-      </p:sp>
-      <p:sp>
-        <p:nvSpPr>
           <p:cNvPr id="12" name="TextBox 11">
             <a:extLst>
               <a:ext uri="{FF2B5EF4-FFF2-40B4-BE49-F238E27FC236}">
@@ -5022,6 +4970,571 @@
               </a:rPr>
               <a:t>분석 계기 및 데이터 소개</a:t>
             </a:r>
+          </a:p>
+        </p:txBody>
+      </p:sp>
+      <p:pic>
+        <p:nvPicPr>
+          <p:cNvPr id="15" name="그림 14">
+            <a:extLst>
+              <a:ext uri="{FF2B5EF4-FFF2-40B4-BE49-F238E27FC236}">
+                <a16:creationId xmlns:a16="http://schemas.microsoft.com/office/drawing/2014/main" id="{2C2E0364-D3C1-407E-8F41-B390F30F1D53}"/>
+              </a:ext>
+            </a:extLst>
+          </p:cNvPr>
+          <p:cNvPicPr>
+            <a:picLocks noChangeAspect="1"/>
+          </p:cNvPicPr>
+          <p:nvPr/>
+        </p:nvPicPr>
+        <p:blipFill>
+          <a:blip r:embed="rId2"/>
+          <a:stretch>
+            <a:fillRect/>
+          </a:stretch>
+        </p:blipFill>
+        <p:spPr>
+          <a:xfrm>
+            <a:off x="251510" y="1721428"/>
+            <a:ext cx="4743449" cy="571500"/>
+          </a:xfrm>
+          <a:prstGeom prst="rect">
+            <a:avLst/>
+          </a:prstGeom>
+        </p:spPr>
+      </p:pic>
+      <p:sp>
+        <p:nvSpPr>
+          <p:cNvPr id="16" name="TextBox 15">
+            <a:extLst>
+              <a:ext uri="{FF2B5EF4-FFF2-40B4-BE49-F238E27FC236}">
+                <a16:creationId xmlns:a16="http://schemas.microsoft.com/office/drawing/2014/main" id="{56A42E4D-E94E-46FD-B5DA-325FF64FCF12}"/>
+              </a:ext>
+            </a:extLst>
+          </p:cNvPr>
+          <p:cNvSpPr txBox="1"/>
+          <p:nvPr/>
+        </p:nvSpPr>
+        <p:spPr>
+          <a:xfrm>
+            <a:off x="286328" y="5991974"/>
+            <a:ext cx="5468356" cy="553998"/>
+          </a:xfrm>
+          <a:prstGeom prst="rect">
+            <a:avLst/>
+          </a:prstGeom>
+          <a:noFill/>
+        </p:spPr>
+        <p:txBody>
+          <a:bodyPr wrap="square" rtlCol="0">
+            <a:spAutoFit/>
+          </a:bodyPr>
+          <a:lstStyle/>
+          <a:p>
+            <a:r>
+              <a:rPr lang="ko-KR" altLang="en-US" sz="600" dirty="0" err="1"/>
+              <a:t>박치현</a:t>
+            </a:r>
+            <a:r>
+              <a:rPr lang="en-US" altLang="ko-KR" sz="600" dirty="0"/>
+              <a:t>,”</a:t>
+            </a:r>
+            <a:r>
+              <a:rPr lang="ko-KR" altLang="en-US" sz="600" i="0" dirty="0">
+                <a:solidFill>
+                  <a:srgbClr val="383838"/>
+                </a:solidFill>
+                <a:effectLst/>
+                <a:latin typeface="Roboto" panose="02000000000000000000" pitchFamily="2" charset="0"/>
+              </a:rPr>
+              <a:t> </a:t>
+            </a:r>
+            <a:r>
+              <a:rPr lang="en-US" altLang="ko-KR" sz="600" i="0" dirty="0">
+                <a:solidFill>
+                  <a:srgbClr val="383838"/>
+                </a:solidFill>
+                <a:effectLst/>
+                <a:latin typeface="Roboto" panose="02000000000000000000" pitchFamily="2" charset="0"/>
+              </a:rPr>
+              <a:t>[</a:t>
+            </a:r>
+            <a:r>
+              <a:rPr lang="ko-KR" altLang="en-US" sz="600" i="0" dirty="0">
+                <a:solidFill>
+                  <a:srgbClr val="383838"/>
+                </a:solidFill>
+                <a:effectLst/>
+                <a:latin typeface="Roboto" panose="02000000000000000000" pitchFamily="2" charset="0"/>
+              </a:rPr>
+              <a:t>르포</a:t>
+            </a:r>
+            <a:r>
+              <a:rPr lang="en-US" altLang="ko-KR" sz="600" i="0" dirty="0">
+                <a:solidFill>
+                  <a:srgbClr val="383838"/>
+                </a:solidFill>
+                <a:effectLst/>
+                <a:latin typeface="Roboto" panose="02000000000000000000" pitchFamily="2" charset="0"/>
+              </a:rPr>
+              <a:t>] </a:t>
+            </a:r>
+            <a:r>
+              <a:rPr lang="ko-KR" altLang="en-US" sz="600" i="0" dirty="0" err="1">
+                <a:solidFill>
+                  <a:srgbClr val="383838"/>
+                </a:solidFill>
+                <a:effectLst/>
+                <a:latin typeface="Roboto" panose="02000000000000000000" pitchFamily="2" charset="0"/>
+              </a:rPr>
+              <a:t>요소수</a:t>
+            </a:r>
+            <a:r>
+              <a:rPr lang="ko-KR" altLang="en-US" sz="600" i="0" dirty="0">
+                <a:solidFill>
+                  <a:srgbClr val="383838"/>
+                </a:solidFill>
+                <a:effectLst/>
+                <a:latin typeface="Roboto" panose="02000000000000000000" pitchFamily="2" charset="0"/>
+              </a:rPr>
+              <a:t> 부족</a:t>
+            </a:r>
+            <a:r>
+              <a:rPr lang="en-US" altLang="ko-KR" sz="600" i="0" dirty="0">
+                <a:solidFill>
+                  <a:srgbClr val="383838"/>
+                </a:solidFill>
+                <a:effectLst/>
+                <a:latin typeface="Roboto" panose="02000000000000000000" pitchFamily="2" charset="0"/>
+              </a:rPr>
+              <a:t>, </a:t>
+            </a:r>
+            <a:r>
+              <a:rPr lang="ko-KR" altLang="en-US" sz="600" i="0" dirty="0">
+                <a:solidFill>
+                  <a:srgbClr val="383838"/>
+                </a:solidFill>
+                <a:effectLst/>
+                <a:latin typeface="Roboto" panose="02000000000000000000" pitchFamily="2" charset="0"/>
+              </a:rPr>
+              <a:t>중국만 바라봐야 하는 ‘벌거벗은 대한민국’</a:t>
+            </a:r>
+            <a:r>
+              <a:rPr lang="en-US" altLang="ko-KR" sz="600" i="0" dirty="0">
+                <a:solidFill>
+                  <a:srgbClr val="383838"/>
+                </a:solidFill>
+                <a:effectLst/>
+                <a:latin typeface="Roboto" panose="02000000000000000000" pitchFamily="2" charset="0"/>
+              </a:rPr>
+              <a:t>”,&lt;</a:t>
+            </a:r>
+            <a:r>
+              <a:rPr lang="ko-KR" altLang="en-US" sz="600" dirty="0">
+                <a:solidFill>
+                  <a:srgbClr val="383838"/>
+                </a:solidFill>
+                <a:latin typeface="Roboto" panose="02000000000000000000" pitchFamily="2" charset="0"/>
+              </a:rPr>
+              <a:t>시사저널</a:t>
+            </a:r>
+            <a:r>
+              <a:rPr lang="en-US" altLang="ko-KR" sz="600" dirty="0">
+                <a:solidFill>
+                  <a:srgbClr val="383838"/>
+                </a:solidFill>
+                <a:latin typeface="Roboto" panose="02000000000000000000" pitchFamily="2" charset="0"/>
+              </a:rPr>
+              <a:t>&gt;,2021.11.16. </a:t>
+            </a:r>
+            <a:r>
+              <a:rPr lang="en-US" altLang="ko-KR" sz="600" dirty="0">
+                <a:solidFill>
+                  <a:srgbClr val="383838"/>
+                </a:solidFill>
+                <a:latin typeface="Roboto" panose="02000000000000000000" pitchFamily="2" charset="0"/>
+                <a:hlinkClick r:id="rId3"/>
+              </a:rPr>
+              <a:t>http://www.sisajournal.com/news/articleView.html?idxno=227553</a:t>
+            </a:r>
+            <a:endParaRPr lang="en-US" altLang="ko-KR" sz="600" dirty="0">
+              <a:solidFill>
+                <a:srgbClr val="383838"/>
+              </a:solidFill>
+              <a:latin typeface="Roboto" panose="02000000000000000000" pitchFamily="2" charset="0"/>
+            </a:endParaRPr>
+          </a:p>
+          <a:p>
+            <a:r>
+              <a:rPr lang="ko-KR" altLang="en-US" sz="600" dirty="0">
+                <a:solidFill>
+                  <a:srgbClr val="383838"/>
+                </a:solidFill>
+                <a:latin typeface="Roboto" panose="02000000000000000000" pitchFamily="2" charset="0"/>
+              </a:rPr>
+              <a:t>전형우</a:t>
+            </a:r>
+            <a:r>
+              <a:rPr lang="en-US" altLang="ko-KR" sz="600" dirty="0">
+                <a:solidFill>
+                  <a:srgbClr val="383838"/>
+                </a:solidFill>
+                <a:latin typeface="Roboto" panose="02000000000000000000" pitchFamily="2" charset="0"/>
+              </a:rPr>
+              <a:t>,”</a:t>
+            </a:r>
+            <a:r>
+              <a:rPr lang="ko-KR" altLang="en-US" sz="600" dirty="0"/>
+              <a:t> 긴급수급조치에도</a:t>
+            </a:r>
+            <a:r>
+              <a:rPr lang="en-US" altLang="ko-KR" sz="600" dirty="0"/>
+              <a:t>…"</a:t>
+            </a:r>
+            <a:r>
+              <a:rPr lang="ko-KR" altLang="en-US" sz="600" dirty="0" err="1"/>
+              <a:t>요소수</a:t>
+            </a:r>
+            <a:r>
+              <a:rPr lang="ko-KR" altLang="en-US" sz="600" dirty="0"/>
+              <a:t> 없어요</a:t>
+            </a:r>
+            <a:r>
+              <a:rPr lang="en-US" altLang="ko-KR" sz="600" dirty="0"/>
+              <a:t>" </a:t>
+            </a:r>
+            <a:r>
+              <a:rPr lang="ko-KR" altLang="en-US" sz="600" dirty="0"/>
+              <a:t>현장은 아우성</a:t>
+            </a:r>
+            <a:r>
+              <a:rPr lang="en-US" altLang="ko-KR" sz="600" dirty="0"/>
+              <a:t>”,&lt;SBS&gt;,2021.11.14.https://news.sbs.co.kr/news/endPage.do?news_id=N1006533752&amp;plink=ORI&amp;cooper=NAVER&amp;plink=COPYPASTE&amp;cooper=SBSNEWSEND</a:t>
+            </a:r>
+            <a:endParaRPr lang="ko-KR" altLang="en-US" sz="600" dirty="0"/>
+          </a:p>
+        </p:txBody>
+      </p:sp>
+      <p:pic>
+        <p:nvPicPr>
+          <p:cNvPr id="17" name="그림 16">
+            <a:extLst>
+              <a:ext uri="{FF2B5EF4-FFF2-40B4-BE49-F238E27FC236}">
+                <a16:creationId xmlns:a16="http://schemas.microsoft.com/office/drawing/2014/main" id="{563B9186-94EB-42CA-8680-F3B5DB065031}"/>
+              </a:ext>
+            </a:extLst>
+          </p:cNvPr>
+          <p:cNvPicPr>
+            <a:picLocks noChangeAspect="1"/>
+          </p:cNvPicPr>
+          <p:nvPr/>
+        </p:nvPicPr>
+        <p:blipFill>
+          <a:blip r:embed="rId4"/>
+          <a:stretch>
+            <a:fillRect/>
+          </a:stretch>
+        </p:blipFill>
+        <p:spPr>
+          <a:xfrm>
+            <a:off x="208972" y="2428309"/>
+            <a:ext cx="5739245" cy="694264"/>
+          </a:xfrm>
+          <a:prstGeom prst="rect">
+            <a:avLst/>
+          </a:prstGeom>
+        </p:spPr>
+      </p:pic>
+      <p:sp>
+        <p:nvSpPr>
+          <p:cNvPr id="18" name="TextBox 17">
+            <a:extLst>
+              <a:ext uri="{FF2B5EF4-FFF2-40B4-BE49-F238E27FC236}">
+                <a16:creationId xmlns:a16="http://schemas.microsoft.com/office/drawing/2014/main" id="{F8CE19C9-0DBC-405F-A5A7-D536F6D1AF2C}"/>
+              </a:ext>
+            </a:extLst>
+          </p:cNvPr>
+          <p:cNvSpPr txBox="1"/>
+          <p:nvPr/>
+        </p:nvSpPr>
+        <p:spPr>
+          <a:xfrm>
+            <a:off x="260746" y="4097076"/>
+            <a:ext cx="4267199" cy="1200329"/>
+          </a:xfrm>
+          <a:prstGeom prst="rect">
+            <a:avLst/>
+          </a:prstGeom>
+          <a:noFill/>
+        </p:spPr>
+        <p:txBody>
+          <a:bodyPr wrap="square" rtlCol="0">
+            <a:spAutoFit/>
+          </a:bodyPr>
+          <a:lstStyle/>
+          <a:p>
+            <a:pPr marL="285750" indent="-285750">
+              <a:buFont typeface="Arial" panose="020B0604020202020204" pitchFamily="34" charset="0"/>
+              <a:buChar char="•"/>
+            </a:pPr>
+            <a:r>
+              <a:rPr lang="ko-KR" altLang="en-US" b="1" dirty="0">
+                <a:ln>
+                  <a:solidFill>
+                    <a:schemeClr val="bg2">
+                      <a:lumMod val="50000"/>
+                      <a:alpha val="15000"/>
+                    </a:schemeClr>
+                  </a:solidFill>
+                </a:ln>
+                <a:solidFill>
+                  <a:schemeClr val="bg2">
+                    <a:lumMod val="50000"/>
+                  </a:schemeClr>
+                </a:solidFill>
+                <a:latin typeface="나눔스퀘어" panose="020B0600000101010101" pitchFamily="50" charset="-127"/>
+                <a:ea typeface="나눔스퀘어" panose="020B0600000101010101" pitchFamily="50" charset="-127"/>
+                <a:cs typeface="조선일보명조" panose="02030304000000000000" pitchFamily="18" charset="-127"/>
+              </a:rPr>
+              <a:t>전국적으로 </a:t>
+            </a:r>
+            <a:r>
+              <a:rPr lang="ko-KR" altLang="en-US" b="1" dirty="0" err="1">
+                <a:ln>
+                  <a:solidFill>
+                    <a:schemeClr val="bg2">
+                      <a:lumMod val="50000"/>
+                      <a:alpha val="15000"/>
+                    </a:schemeClr>
+                  </a:solidFill>
+                </a:ln>
+                <a:solidFill>
+                  <a:schemeClr val="bg2">
+                    <a:lumMod val="50000"/>
+                  </a:schemeClr>
+                </a:solidFill>
+                <a:latin typeface="나눔스퀘어" panose="020B0600000101010101" pitchFamily="50" charset="-127"/>
+                <a:ea typeface="나눔스퀘어" panose="020B0600000101010101" pitchFamily="50" charset="-127"/>
+                <a:cs typeface="조선일보명조" panose="02030304000000000000" pitchFamily="18" charset="-127"/>
+              </a:rPr>
+              <a:t>요소수</a:t>
+            </a:r>
+            <a:r>
+              <a:rPr lang="ko-KR" altLang="en-US" b="1" dirty="0">
+                <a:ln>
+                  <a:solidFill>
+                    <a:schemeClr val="bg2">
+                      <a:lumMod val="50000"/>
+                      <a:alpha val="15000"/>
+                    </a:schemeClr>
+                  </a:solidFill>
+                </a:ln>
+                <a:solidFill>
+                  <a:schemeClr val="bg2">
+                    <a:lumMod val="50000"/>
+                  </a:schemeClr>
+                </a:solidFill>
+                <a:latin typeface="나눔스퀘어" panose="020B0600000101010101" pitchFamily="50" charset="-127"/>
+                <a:ea typeface="나눔스퀘어" panose="020B0600000101010101" pitchFamily="50" charset="-127"/>
+                <a:cs typeface="조선일보명조" panose="02030304000000000000" pitchFamily="18" charset="-127"/>
+              </a:rPr>
+              <a:t> </a:t>
+            </a:r>
+            <a:r>
+              <a:rPr lang="en-US" altLang="ko-KR" b="1" dirty="0">
+                <a:ln>
+                  <a:solidFill>
+                    <a:schemeClr val="bg2">
+                      <a:lumMod val="50000"/>
+                      <a:alpha val="15000"/>
+                    </a:schemeClr>
+                  </a:solidFill>
+                </a:ln>
+                <a:solidFill>
+                  <a:schemeClr val="bg2">
+                    <a:lumMod val="50000"/>
+                  </a:schemeClr>
+                </a:solidFill>
+                <a:latin typeface="나눔스퀘어" panose="020B0600000101010101" pitchFamily="50" charset="-127"/>
+                <a:ea typeface="나눔스퀘어" panose="020B0600000101010101" pitchFamily="50" charset="-127"/>
+                <a:cs typeface="조선일보명조" panose="02030304000000000000" pitchFamily="18" charset="-127"/>
+              </a:rPr>
+              <a:t>‘</a:t>
+            </a:r>
+            <a:r>
+              <a:rPr lang="ko-KR" altLang="en-US" b="1" dirty="0">
+                <a:ln>
+                  <a:solidFill>
+                    <a:schemeClr val="bg2">
+                      <a:lumMod val="50000"/>
+                      <a:alpha val="15000"/>
+                    </a:schemeClr>
+                  </a:solidFill>
+                </a:ln>
+                <a:solidFill>
+                  <a:schemeClr val="bg2">
+                    <a:lumMod val="50000"/>
+                  </a:schemeClr>
+                </a:solidFill>
+                <a:latin typeface="나눔스퀘어" panose="020B0600000101010101" pitchFamily="50" charset="-127"/>
+                <a:ea typeface="나눔스퀘어" panose="020B0600000101010101" pitchFamily="50" charset="-127"/>
+                <a:cs typeface="조선일보명조" panose="02030304000000000000" pitchFamily="18" charset="-127"/>
+              </a:rPr>
+              <a:t>대란</a:t>
+            </a:r>
+            <a:r>
+              <a:rPr lang="en-US" altLang="ko-KR" b="1" dirty="0">
+                <a:ln>
+                  <a:solidFill>
+                    <a:schemeClr val="bg2">
+                      <a:lumMod val="50000"/>
+                      <a:alpha val="15000"/>
+                    </a:schemeClr>
+                  </a:solidFill>
+                </a:ln>
+                <a:solidFill>
+                  <a:schemeClr val="bg2">
+                    <a:lumMod val="50000"/>
+                  </a:schemeClr>
+                </a:solidFill>
+                <a:latin typeface="나눔스퀘어" panose="020B0600000101010101" pitchFamily="50" charset="-127"/>
+                <a:ea typeface="나눔스퀘어" panose="020B0600000101010101" pitchFamily="50" charset="-127"/>
+                <a:cs typeface="조선일보명조" panose="02030304000000000000" pitchFamily="18" charset="-127"/>
+              </a:rPr>
+              <a:t>＇</a:t>
+            </a:r>
+            <a:r>
+              <a:rPr lang="ko-KR" altLang="en-US" b="1" dirty="0">
+                <a:ln>
+                  <a:solidFill>
+                    <a:schemeClr val="bg2">
+                      <a:lumMod val="50000"/>
+                      <a:alpha val="15000"/>
+                    </a:schemeClr>
+                  </a:solidFill>
+                </a:ln>
+                <a:solidFill>
+                  <a:schemeClr val="bg2">
+                    <a:lumMod val="50000"/>
+                  </a:schemeClr>
+                </a:solidFill>
+                <a:latin typeface="나눔스퀘어" panose="020B0600000101010101" pitchFamily="50" charset="-127"/>
+                <a:ea typeface="나눔스퀘어" panose="020B0600000101010101" pitchFamily="50" charset="-127"/>
+                <a:cs typeface="조선일보명조" panose="02030304000000000000" pitchFamily="18" charset="-127"/>
+              </a:rPr>
+              <a:t>인 상황</a:t>
+            </a:r>
+            <a:endParaRPr lang="en-US" altLang="ko-KR" b="1" dirty="0">
+              <a:ln>
+                <a:solidFill>
+                  <a:schemeClr val="bg2">
+                    <a:lumMod val="50000"/>
+                    <a:alpha val="15000"/>
+                  </a:schemeClr>
+                </a:solidFill>
+              </a:ln>
+              <a:solidFill>
+                <a:schemeClr val="bg2">
+                  <a:lumMod val="50000"/>
+                </a:schemeClr>
+              </a:solidFill>
+              <a:latin typeface="나눔스퀘어" panose="020B0600000101010101" pitchFamily="50" charset="-127"/>
+              <a:ea typeface="나눔스퀘어" panose="020B0600000101010101" pitchFamily="50" charset="-127"/>
+              <a:cs typeface="조선일보명조" panose="02030304000000000000" pitchFamily="18" charset="-127"/>
+            </a:endParaRPr>
+          </a:p>
+          <a:p>
+            <a:endParaRPr lang="en-US" altLang="ko-KR" b="1" dirty="0">
+              <a:ln>
+                <a:solidFill>
+                  <a:schemeClr val="bg2">
+                    <a:lumMod val="50000"/>
+                    <a:alpha val="15000"/>
+                  </a:schemeClr>
+                </a:solidFill>
+              </a:ln>
+              <a:solidFill>
+                <a:schemeClr val="bg2">
+                  <a:lumMod val="50000"/>
+                </a:schemeClr>
+              </a:solidFill>
+              <a:latin typeface="나눔스퀘어" panose="020B0600000101010101" pitchFamily="50" charset="-127"/>
+              <a:ea typeface="나눔스퀘어" panose="020B0600000101010101" pitchFamily="50" charset="-127"/>
+              <a:cs typeface="조선일보명조" panose="02030304000000000000" pitchFamily="18" charset="-127"/>
+            </a:endParaRPr>
+          </a:p>
+          <a:p>
+            <a:pPr marL="285750" indent="-285750">
+              <a:buFont typeface="Arial" panose="020B0604020202020204" pitchFamily="34" charset="0"/>
+              <a:buChar char="•"/>
+            </a:pPr>
+            <a:r>
+              <a:rPr lang="ko-KR" altLang="en-US" sz="1800" b="1" dirty="0">
+                <a:ln>
+                  <a:solidFill>
+                    <a:schemeClr val="bg2">
+                      <a:lumMod val="50000"/>
+                      <a:alpha val="15000"/>
+                    </a:schemeClr>
+                  </a:solidFill>
+                </a:ln>
+                <a:solidFill>
+                  <a:schemeClr val="bg2">
+                    <a:lumMod val="50000"/>
+                  </a:schemeClr>
+                </a:solidFill>
+                <a:latin typeface="나눔스퀘어" panose="020B0600000101010101" pitchFamily="50" charset="-127"/>
+                <a:ea typeface="나눔스퀘어" panose="020B0600000101010101" pitchFamily="50" charset="-127"/>
+                <a:cs typeface="조선일보명조" panose="02030304000000000000" pitchFamily="18" charset="-127"/>
+              </a:rPr>
+              <a:t>요소수</a:t>
+            </a:r>
+            <a:r>
+              <a:rPr lang="ko-KR" altLang="en-US" b="1" dirty="0">
+                <a:ln>
+                  <a:solidFill>
+                    <a:schemeClr val="bg2">
+                      <a:lumMod val="50000"/>
+                      <a:alpha val="15000"/>
+                    </a:schemeClr>
+                  </a:solidFill>
+                </a:ln>
+                <a:solidFill>
+                  <a:schemeClr val="bg2">
+                    <a:lumMod val="50000"/>
+                  </a:schemeClr>
+                </a:solidFill>
+                <a:latin typeface="나눔스퀘어" panose="020B0600000101010101" pitchFamily="50" charset="-127"/>
+                <a:ea typeface="나눔스퀘어" panose="020B0600000101010101" pitchFamily="50" charset="-127"/>
+                <a:cs typeface="조선일보명조" panose="02030304000000000000" pitchFamily="18" charset="-127"/>
+              </a:rPr>
+              <a:t>의 적절한 배분이 필요한 상황</a:t>
+            </a:r>
+            <a:endParaRPr lang="en-US" altLang="ko-KR" sz="1800" b="1" dirty="0">
+              <a:ln>
+                <a:solidFill>
+                  <a:schemeClr val="bg2">
+                    <a:lumMod val="50000"/>
+                    <a:alpha val="15000"/>
+                  </a:schemeClr>
+                </a:solidFill>
+              </a:ln>
+              <a:solidFill>
+                <a:schemeClr val="bg2">
+                  <a:lumMod val="50000"/>
+                </a:schemeClr>
+              </a:solidFill>
+              <a:latin typeface="나눔스퀘어" panose="020B0600000101010101" pitchFamily="50" charset="-127"/>
+              <a:ea typeface="나눔스퀘어" panose="020B0600000101010101" pitchFamily="50" charset="-127"/>
+              <a:cs typeface="조선일보명조" panose="02030304000000000000" pitchFamily="18" charset="-127"/>
+            </a:endParaRPr>
+          </a:p>
+          <a:p>
+            <a:pPr marL="285750" indent="-285750">
+              <a:buFont typeface="Arial" panose="020B0604020202020204" pitchFamily="34" charset="0"/>
+              <a:buChar char="•"/>
+            </a:pPr>
+            <a:endParaRPr lang="ko-KR" altLang="en-US" b="1" dirty="0"/>
           </a:p>
         </p:txBody>
       </p:sp>

</xml_diff>